<commit_message>
Add updated presentation, has figures.
</commit_message>
<xml_diff>
--- a/Presentation_v1.pptx
+++ b/Presentation_v1.pptx
@@ -7,15 +7,19 @@
   <p:sldIdLst>
     <p:sldId id="256" r:id="rId2"/>
     <p:sldId id="257" r:id="rId3"/>
-    <p:sldId id="258" r:id="rId4"/>
-    <p:sldId id="262" r:id="rId5"/>
-    <p:sldId id="259" r:id="rId6"/>
-    <p:sldId id="263" r:id="rId7"/>
-    <p:sldId id="264" r:id="rId8"/>
-    <p:sldId id="260" r:id="rId9"/>
-    <p:sldId id="265" r:id="rId10"/>
-    <p:sldId id="266" r:id="rId11"/>
-    <p:sldId id="261" r:id="rId12"/>
+    <p:sldId id="269" r:id="rId4"/>
+    <p:sldId id="268" r:id="rId5"/>
+    <p:sldId id="258" r:id="rId6"/>
+    <p:sldId id="262" r:id="rId7"/>
+    <p:sldId id="259" r:id="rId8"/>
+    <p:sldId id="263" r:id="rId9"/>
+    <p:sldId id="264" r:id="rId10"/>
+    <p:sldId id="260" r:id="rId11"/>
+    <p:sldId id="265" r:id="rId12"/>
+    <p:sldId id="266" r:id="rId13"/>
+    <p:sldId id="261" r:id="rId14"/>
+    <p:sldId id="267" r:id="rId15"/>
+    <p:sldId id="270" r:id="rId16"/>
   </p:sldIdLst>
   <p:sldSz cx="12192000" cy="6858000"/>
   <p:notesSz cx="6858000" cy="9144000"/>
@@ -251,7 +255,7 @@
           <a:p>
             <a:fld id="{53DC798D-381E-ED4A-8F36-6CFFBD026857}" type="datetimeFigureOut">
               <a:rPr lang="en-US" smtClean="0"/>
-              <a:t>11/28/2018</a:t>
+              <a:t>11/29/2018</a:t>
             </a:fld>
             <a:endParaRPr lang="en-US"/>
           </a:p>
@@ -419,7 +423,7 @@
           <a:p>
             <a:fld id="{53DC798D-381E-ED4A-8F36-6CFFBD026857}" type="datetimeFigureOut">
               <a:rPr lang="en-US" smtClean="0"/>
-              <a:t>11/28/2018</a:t>
+              <a:t>11/29/2018</a:t>
             </a:fld>
             <a:endParaRPr lang="en-US"/>
           </a:p>
@@ -597,7 +601,7 @@
           <a:p>
             <a:fld id="{53DC798D-381E-ED4A-8F36-6CFFBD026857}" type="datetimeFigureOut">
               <a:rPr lang="en-US" smtClean="0"/>
-              <a:t>11/28/2018</a:t>
+              <a:t>11/29/2018</a:t>
             </a:fld>
             <a:endParaRPr lang="en-US"/>
           </a:p>
@@ -765,7 +769,7 @@
           <a:p>
             <a:fld id="{53DC798D-381E-ED4A-8F36-6CFFBD026857}" type="datetimeFigureOut">
               <a:rPr lang="en-US" smtClean="0"/>
-              <a:t>11/28/2018</a:t>
+              <a:t>11/29/2018</a:t>
             </a:fld>
             <a:endParaRPr lang="en-US"/>
           </a:p>
@@ -1010,7 +1014,7 @@
           <a:p>
             <a:fld id="{53DC798D-381E-ED4A-8F36-6CFFBD026857}" type="datetimeFigureOut">
               <a:rPr lang="en-US" smtClean="0"/>
-              <a:t>11/28/2018</a:t>
+              <a:t>11/29/2018</a:t>
             </a:fld>
             <a:endParaRPr lang="en-US"/>
           </a:p>
@@ -1239,7 +1243,7 @@
           <a:p>
             <a:fld id="{53DC798D-381E-ED4A-8F36-6CFFBD026857}" type="datetimeFigureOut">
               <a:rPr lang="en-US" smtClean="0"/>
-              <a:t>11/28/2018</a:t>
+              <a:t>11/29/2018</a:t>
             </a:fld>
             <a:endParaRPr lang="en-US"/>
           </a:p>
@@ -1603,7 +1607,7 @@
           <a:p>
             <a:fld id="{53DC798D-381E-ED4A-8F36-6CFFBD026857}" type="datetimeFigureOut">
               <a:rPr lang="en-US" smtClean="0"/>
-              <a:t>11/28/2018</a:t>
+              <a:t>11/29/2018</a:t>
             </a:fld>
             <a:endParaRPr lang="en-US"/>
           </a:p>
@@ -1720,7 +1724,7 @@
           <a:p>
             <a:fld id="{53DC798D-381E-ED4A-8F36-6CFFBD026857}" type="datetimeFigureOut">
               <a:rPr lang="en-US" smtClean="0"/>
-              <a:t>11/28/2018</a:t>
+              <a:t>11/29/2018</a:t>
             </a:fld>
             <a:endParaRPr lang="en-US"/>
           </a:p>
@@ -1815,7 +1819,7 @@
           <a:p>
             <a:fld id="{53DC798D-381E-ED4A-8F36-6CFFBD026857}" type="datetimeFigureOut">
               <a:rPr lang="en-US" smtClean="0"/>
-              <a:t>11/28/2018</a:t>
+              <a:t>11/29/2018</a:t>
             </a:fld>
             <a:endParaRPr lang="en-US"/>
           </a:p>
@@ -2090,7 +2094,7 @@
           <a:p>
             <a:fld id="{53DC798D-381E-ED4A-8F36-6CFFBD026857}" type="datetimeFigureOut">
               <a:rPr lang="en-US" smtClean="0"/>
-              <a:t>11/28/2018</a:t>
+              <a:t>11/29/2018</a:t>
             </a:fld>
             <a:endParaRPr lang="en-US"/>
           </a:p>
@@ -2342,7 +2346,7 @@
           <a:p>
             <a:fld id="{53DC798D-381E-ED4A-8F36-6CFFBD026857}" type="datetimeFigureOut">
               <a:rPr lang="en-US" smtClean="0"/>
-              <a:t>11/28/2018</a:t>
+              <a:t>11/29/2018</a:t>
             </a:fld>
             <a:endParaRPr lang="en-US"/>
           </a:p>
@@ -2553,7 +2557,7 @@
           <a:p>
             <a:fld id="{53DC798D-381E-ED4A-8F36-6CFFBD026857}" type="datetimeFigureOut">
               <a:rPr lang="en-US" smtClean="0"/>
-              <a:t>11/28/2018</a:t>
+              <a:t>11/29/2018</a:t>
             </a:fld>
             <a:endParaRPr lang="en-US"/>
           </a:p>
@@ -3064,37 +3068,44 @@
           <a:p>
             <a:r>
               <a:rPr lang="en-US" dirty="0"/>
-              <a:t>Results – modifiers</a:t>
-            </a:r>
-          </a:p>
-        </p:txBody>
-      </p:sp>
-      <p:sp>
-        <p:nvSpPr>
-          <p:cNvPr id="3" name="Content Placeholder 2"/>
-          <p:cNvSpPr>
-            <a:spLocks noGrp="1"/>
-          </p:cNvSpPr>
+              <a:t>Results - database</a:t>
+            </a:r>
+          </a:p>
+        </p:txBody>
+      </p:sp>
+      <p:pic>
+        <p:nvPicPr>
+          <p:cNvPr id="4" name="Content Placeholder 3"/>
+          <p:cNvPicPr>
+            <a:picLocks noGrp="1" noChangeAspect="1"/>
+          </p:cNvPicPr>
           <p:nvPr>
             <p:ph idx="1"/>
           </p:nvPr>
-        </p:nvSpPr>
-        <p:spPr/>
-        <p:txBody>
-          <a:bodyPr/>
-          <a:lstStyle/>
-          <a:p>
-            <a:pPr marL="0" indent="0">
-              <a:buNone/>
-            </a:pPr>
-            <a:endParaRPr lang="en-US" dirty="0"/>
-          </a:p>
-        </p:txBody>
-      </p:sp>
+        </p:nvPicPr>
+        <p:blipFill>
+          <a:blip r:embed="rId2">
+            <a:extLst>
+              <a:ext uri="{28A0092B-C50C-407E-A947-70E740481C1C}">
+                <a14:useLocalDpi xmlns:a14="http://schemas.microsoft.com/office/drawing/2010/main" val="0"/>
+              </a:ext>
+            </a:extLst>
+          </a:blip>
+          <a:stretch>
+            <a:fillRect/>
+          </a:stretch>
+        </p:blipFill>
+        <p:spPr>
+          <a:xfrm>
+            <a:off x="2337683" y="1612495"/>
+            <a:ext cx="7324483" cy="4708596"/>
+          </a:xfrm>
+        </p:spPr>
+      </p:pic>
     </p:spTree>
     <p:extLst>
       <p:ext uri="{BB962C8B-B14F-4D97-AF65-F5344CB8AC3E}">
-        <p14:creationId xmlns:p14="http://schemas.microsoft.com/office/powerpoint/2010/main" val="1515879603"/>
+        <p14:creationId xmlns:p14="http://schemas.microsoft.com/office/powerpoint/2010/main" val="760348242"/>
       </p:ext>
     </p:extLst>
   </p:cSld>
@@ -3138,8 +3149,223 @@
           <a:p>
             <a:r>
               <a:rPr lang="en-US" dirty="0"/>
-              <a:t>Discussion</a:t>
-            </a:r>
+              <a:t>Results – overall effects</a:t>
+            </a:r>
+          </a:p>
+        </p:txBody>
+      </p:sp>
+      <p:pic>
+        <p:nvPicPr>
+          <p:cNvPr id="4" name="Content Placeholder 3"/>
+          <p:cNvPicPr>
+            <a:picLocks noGrp="1" noChangeAspect="1"/>
+          </p:cNvPicPr>
+          <p:nvPr>
+            <p:ph idx="1"/>
+          </p:nvPr>
+        </p:nvPicPr>
+        <p:blipFill>
+          <a:blip r:embed="rId2">
+            <a:extLst>
+              <a:ext uri="{28A0092B-C50C-407E-A947-70E740481C1C}">
+                <a14:useLocalDpi xmlns:a14="http://schemas.microsoft.com/office/drawing/2010/main" val="0"/>
+              </a:ext>
+            </a:extLst>
+          </a:blip>
+          <a:stretch>
+            <a:fillRect/>
+          </a:stretch>
+        </p:blipFill>
+        <p:spPr>
+          <a:xfrm>
+            <a:off x="2891021" y="1939318"/>
+            <a:ext cx="6409957" cy="4123952"/>
+          </a:xfrm>
+        </p:spPr>
+      </p:pic>
+    </p:spTree>
+    <p:extLst>
+      <p:ext uri="{BB962C8B-B14F-4D97-AF65-F5344CB8AC3E}">
+        <p14:creationId xmlns:p14="http://schemas.microsoft.com/office/powerpoint/2010/main" val="2225925255"/>
+      </p:ext>
+    </p:extLst>
+  </p:cSld>
+  <p:clrMapOvr>
+    <a:masterClrMapping/>
+  </p:clrMapOvr>
+</p:sld>
+</file>
+
+<file path=ppt/slides/slide12.xml><?xml version="1.0" encoding="utf-8"?>
+<p:sld xmlns:a="http://schemas.openxmlformats.org/drawingml/2006/main" xmlns:r="http://schemas.openxmlformats.org/officeDocument/2006/relationships" xmlns:p="http://schemas.openxmlformats.org/presentationml/2006/main">
+  <p:cSld>
+    <p:spTree>
+      <p:nvGrpSpPr>
+        <p:cNvPr id="1" name=""/>
+        <p:cNvGrpSpPr/>
+        <p:nvPr/>
+      </p:nvGrpSpPr>
+      <p:grpSpPr>
+        <a:xfrm>
+          <a:off x="0" y="0"/>
+          <a:ext cx="0" cy="0"/>
+          <a:chOff x="0" y="0"/>
+          <a:chExt cx="0" cy="0"/>
+        </a:xfrm>
+      </p:grpSpPr>
+      <p:sp>
+        <p:nvSpPr>
+          <p:cNvPr id="2" name="Title 1"/>
+          <p:cNvSpPr>
+            <a:spLocks noGrp="1"/>
+          </p:cNvSpPr>
+          <p:nvPr>
+            <p:ph type="title"/>
+          </p:nvPr>
+        </p:nvSpPr>
+        <p:spPr/>
+        <p:txBody>
+          <a:bodyPr/>
+          <a:lstStyle/>
+          <a:p>
+            <a:r>
+              <a:rPr lang="en-US" dirty="0"/>
+              <a:t>Results – modifiers</a:t>
+            </a:r>
+          </a:p>
+        </p:txBody>
+      </p:sp>
+      <p:pic>
+        <p:nvPicPr>
+          <p:cNvPr id="4" name="Content Placeholder 3"/>
+          <p:cNvPicPr>
+            <a:picLocks noGrp="1" noChangeAspect="1"/>
+          </p:cNvPicPr>
+          <p:nvPr>
+            <p:ph idx="1"/>
+          </p:nvPr>
+        </p:nvPicPr>
+        <p:blipFill>
+          <a:blip r:embed="rId2">
+            <a:extLst>
+              <a:ext uri="{28A0092B-C50C-407E-A947-70E740481C1C}">
+                <a14:useLocalDpi xmlns:a14="http://schemas.microsoft.com/office/drawing/2010/main" val="0"/>
+              </a:ext>
+            </a:extLst>
+          </a:blip>
+          <a:stretch>
+            <a:fillRect/>
+          </a:stretch>
+        </p:blipFill>
+        <p:spPr>
+          <a:xfrm>
+            <a:off x="2360210" y="1526650"/>
+            <a:ext cx="7471579" cy="4806964"/>
+          </a:xfrm>
+        </p:spPr>
+      </p:pic>
+    </p:spTree>
+    <p:extLst>
+      <p:ext uri="{BB962C8B-B14F-4D97-AF65-F5344CB8AC3E}">
+        <p14:creationId xmlns:p14="http://schemas.microsoft.com/office/powerpoint/2010/main" val="1515879603"/>
+      </p:ext>
+    </p:extLst>
+  </p:cSld>
+  <p:clrMapOvr>
+    <a:masterClrMapping/>
+  </p:clrMapOvr>
+</p:sld>
+</file>
+
+<file path=ppt/slides/slide13.xml><?xml version="1.0" encoding="utf-8"?>
+<p:sld xmlns:a="http://schemas.openxmlformats.org/drawingml/2006/main" xmlns:r="http://schemas.openxmlformats.org/officeDocument/2006/relationships" xmlns:p="http://schemas.openxmlformats.org/presentationml/2006/main">
+  <p:cSld>
+    <p:spTree>
+      <p:nvGrpSpPr>
+        <p:cNvPr id="1" name=""/>
+        <p:cNvGrpSpPr/>
+        <p:nvPr/>
+      </p:nvGrpSpPr>
+      <p:grpSpPr>
+        <a:xfrm>
+          <a:off x="0" y="0"/>
+          <a:ext cx="0" cy="0"/>
+          <a:chOff x="0" y="0"/>
+          <a:chExt cx="0" cy="0"/>
+        </a:xfrm>
+      </p:grpSpPr>
+      <p:pic>
+        <p:nvPicPr>
+          <p:cNvPr id="5" name="Content Placeholder 3"/>
+          <p:cNvPicPr>
+            <a:picLocks noChangeAspect="1"/>
+          </p:cNvPicPr>
+          <p:nvPr/>
+        </p:nvPicPr>
+        <p:blipFill>
+          <a:blip r:embed="rId2">
+            <a:extLst>
+              <a:ext uri="{28A0092B-C50C-407E-A947-70E740481C1C}">
+                <a14:useLocalDpi xmlns:a14="http://schemas.microsoft.com/office/drawing/2010/main" val="0"/>
+              </a:ext>
+            </a:extLst>
+          </a:blip>
+          <a:stretch>
+            <a:fillRect/>
+          </a:stretch>
+        </p:blipFill>
+        <p:spPr>
+          <a:xfrm>
+            <a:off x="4990166" y="2187948"/>
+            <a:ext cx="6409957" cy="4123952"/>
+          </a:xfrm>
+          <a:prstGeom prst="rect">
+            <a:avLst/>
+          </a:prstGeom>
+        </p:spPr>
+      </p:pic>
+      <p:sp>
+        <p:nvSpPr>
+          <p:cNvPr id="2" name="Title 1"/>
+          <p:cNvSpPr>
+            <a:spLocks noGrp="1"/>
+          </p:cNvSpPr>
+          <p:nvPr>
+            <p:ph type="title"/>
+          </p:nvPr>
+        </p:nvSpPr>
+        <p:spPr>
+          <a:xfrm>
+            <a:off x="838200" y="365125"/>
+            <a:ext cx="11025146" cy="1325563"/>
+          </a:xfrm>
+        </p:spPr>
+        <p:txBody>
+          <a:bodyPr>
+            <a:normAutofit fontScale="90000"/>
+          </a:bodyPr>
+          <a:lstStyle/>
+          <a:p>
+            <a:r>
+              <a:rPr lang="en-US" dirty="0"/>
+              <a:t>Question:</a:t>
+            </a:r>
+            <a:br>
+              <a:rPr lang="en-US" dirty="0"/>
+            </a:br>
+            <a:r>
+              <a:rPr lang="en-US" dirty="0">
+                <a:solidFill>
+                  <a:srgbClr val="FF0000"/>
+                </a:solidFill>
+              </a:rPr>
+              <a:t>Are longer crop rotations associated with less weed pressure?</a:t>
+            </a:r>
+            <a:endParaRPr lang="en-US" dirty="0">
+              <a:solidFill>
+                <a:srgbClr val="FF0000"/>
+              </a:solidFill>
+            </a:endParaRPr>
           </a:p>
         </p:txBody>
       </p:sp>
@@ -3153,48 +3379,42 @@
             <p:ph idx="1"/>
           </p:nvPr>
         </p:nvSpPr>
-        <p:spPr/>
-        <p:txBody>
-          <a:bodyPr/>
-          <a:lstStyle/>
+        <p:spPr>
+          <a:xfrm>
+            <a:off x="663272" y="1825625"/>
+            <a:ext cx="3598628" cy="4351338"/>
+          </a:xfrm>
+        </p:spPr>
+        <p:txBody>
+          <a:bodyPr>
+            <a:normAutofit/>
+          </a:bodyPr>
+          <a:lstStyle/>
+          <a:p>
+            <a:endParaRPr lang="en-US" dirty="0"/>
+          </a:p>
           <a:p>
             <a:r>
               <a:rPr lang="en-US" dirty="0"/>
-              <a:t>Are extended crop rotations associated with less weed pressure?</a:t>
-            </a:r>
-          </a:p>
-          <a:p>
+              <a:t>Longer crop rotations reduce weed </a:t>
+            </a:r>
+            <a:r>
+              <a:rPr lang="en-US" dirty="0" smtClean="0"/>
+              <a:t>density by ~50%</a:t>
+            </a:r>
+          </a:p>
+          <a:p>
+            <a:r>
+              <a:rPr lang="en-US" dirty="0" smtClean="0"/>
+              <a:t>Weed biomass trends towards a reduction, but not significantly.</a:t>
+            </a:r>
             <a:endParaRPr lang="en-US" dirty="0"/>
           </a:p>
           <a:p>
-            <a:r>
-              <a:rPr lang="en-US" dirty="0"/>
-              <a:t>Longer crop rotations reduce weed density, but not weed biomass.</a:t>
-            </a:r>
-          </a:p>
-          <a:p>
-            <a:pPr lvl="1"/>
-            <a:r>
-              <a:rPr lang="en-US" dirty="0"/>
-              <a:t>This makes sense. Other factors, like what crop you are growing, what method of weed control you are using, etc. are stronger drivers of weed biomass than the rotation the crop </a:t>
-            </a:r>
-            <a:r>
-              <a:rPr lang="en-US"/>
-              <a:t>is grown in. </a:t>
-            </a:r>
+            <a:pPr marL="0" indent="0">
+              <a:buNone/>
+            </a:pPr>
             <a:endParaRPr lang="en-US" dirty="0"/>
-          </a:p>
-          <a:p>
-            <a:r>
-              <a:rPr lang="en-US" dirty="0"/>
-              <a:t>Weed density is particularly reduced in zero-tillage systems.</a:t>
-            </a:r>
-          </a:p>
-          <a:p>
-            <a:r>
-              <a:rPr lang="en-US" dirty="0"/>
-              <a:t>Longer crop rotations reduce single (likely problematic) weeds more so than the entire weed community. </a:t>
-            </a:r>
           </a:p>
         </p:txBody>
       </p:sp>
@@ -3202,6 +3422,230 @@
     <p:extLst>
       <p:ext uri="{BB962C8B-B14F-4D97-AF65-F5344CB8AC3E}">
         <p14:creationId xmlns:p14="http://schemas.microsoft.com/office/powerpoint/2010/main" val="1437867342"/>
+      </p:ext>
+    </p:extLst>
+  </p:cSld>
+  <p:clrMapOvr>
+    <a:masterClrMapping/>
+  </p:clrMapOvr>
+</p:sld>
+</file>
+
+<file path=ppt/slides/slide14.xml><?xml version="1.0" encoding="utf-8"?>
+<p:sld xmlns:a="http://schemas.openxmlformats.org/drawingml/2006/main" xmlns:r="http://schemas.openxmlformats.org/officeDocument/2006/relationships" xmlns:p="http://schemas.openxmlformats.org/presentationml/2006/main">
+  <p:cSld>
+    <p:spTree>
+      <p:nvGrpSpPr>
+        <p:cNvPr id="1" name=""/>
+        <p:cNvGrpSpPr/>
+        <p:nvPr/>
+      </p:nvGrpSpPr>
+      <p:grpSpPr>
+        <a:xfrm>
+          <a:off x="0" y="0"/>
+          <a:ext cx="0" cy="0"/>
+          <a:chOff x="0" y="0"/>
+          <a:chExt cx="0" cy="0"/>
+        </a:xfrm>
+      </p:grpSpPr>
+      <p:sp>
+        <p:nvSpPr>
+          <p:cNvPr id="2" name="Title 1"/>
+          <p:cNvSpPr>
+            <a:spLocks noGrp="1"/>
+          </p:cNvSpPr>
+          <p:nvPr>
+            <p:ph type="title"/>
+          </p:nvPr>
+        </p:nvSpPr>
+        <p:spPr/>
+        <p:txBody>
+          <a:bodyPr/>
+          <a:lstStyle/>
+          <a:p>
+            <a:r>
+              <a:rPr lang="en-US" dirty="0" smtClean="0"/>
+              <a:t>Under what circumstances?</a:t>
+            </a:r>
+            <a:endParaRPr lang="en-US" dirty="0"/>
+          </a:p>
+        </p:txBody>
+      </p:sp>
+      <p:sp>
+        <p:nvSpPr>
+          <p:cNvPr id="3" name="Content Placeholder 2"/>
+          <p:cNvSpPr>
+            <a:spLocks noGrp="1"/>
+          </p:cNvSpPr>
+          <p:nvPr>
+            <p:ph idx="1"/>
+          </p:nvPr>
+        </p:nvSpPr>
+        <p:spPr>
+          <a:xfrm>
+            <a:off x="838200" y="1825625"/>
+            <a:ext cx="5459233" cy="4351338"/>
+          </a:xfrm>
+        </p:spPr>
+        <p:txBody>
+          <a:bodyPr>
+            <a:normAutofit/>
+          </a:bodyPr>
+          <a:lstStyle/>
+          <a:p>
+            <a:r>
+              <a:rPr lang="en-US" dirty="0" smtClean="0"/>
+              <a:t>Longer </a:t>
+            </a:r>
+            <a:r>
+              <a:rPr lang="en-US" dirty="0"/>
+              <a:t>crop rotations reduce single (likely problematic) weeds more so than the entire weed community. </a:t>
+            </a:r>
+            <a:endParaRPr lang="en-US" dirty="0" smtClean="0"/>
+          </a:p>
+          <a:p>
+            <a:r>
+              <a:rPr lang="en-US" dirty="0"/>
+              <a:t>Weed density is particularly reduced in zero-tillage systems</a:t>
+            </a:r>
+            <a:r>
+              <a:rPr lang="en-US" dirty="0" smtClean="0"/>
+              <a:t>.</a:t>
+            </a:r>
+          </a:p>
+          <a:p>
+            <a:r>
+              <a:rPr lang="en-US" dirty="0" smtClean="0"/>
+              <a:t>Long rotations help in both herbicide- and organic-based systems. </a:t>
+            </a:r>
+            <a:endParaRPr lang="en-US" dirty="0"/>
+          </a:p>
+          <a:p>
+            <a:endParaRPr lang="en-US" dirty="0"/>
+          </a:p>
+        </p:txBody>
+      </p:sp>
+      <p:pic>
+        <p:nvPicPr>
+          <p:cNvPr id="4" name="Content Placeholder 3"/>
+          <p:cNvPicPr>
+            <a:picLocks noChangeAspect="1"/>
+          </p:cNvPicPr>
+          <p:nvPr/>
+        </p:nvPicPr>
+        <p:blipFill>
+          <a:blip r:embed="rId2">
+            <a:extLst>
+              <a:ext uri="{28A0092B-C50C-407E-A947-70E740481C1C}">
+                <a14:useLocalDpi xmlns:a14="http://schemas.microsoft.com/office/drawing/2010/main" val="0"/>
+              </a:ext>
+            </a:extLst>
+          </a:blip>
+          <a:stretch>
+            <a:fillRect/>
+          </a:stretch>
+        </p:blipFill>
+        <p:spPr>
+          <a:xfrm>
+            <a:off x="6225871" y="2053011"/>
+            <a:ext cx="5894567" cy="4123952"/>
+          </a:xfrm>
+          <a:prstGeom prst="rect">
+            <a:avLst/>
+          </a:prstGeom>
+        </p:spPr>
+      </p:pic>
+    </p:spTree>
+    <p:extLst>
+      <p:ext uri="{BB962C8B-B14F-4D97-AF65-F5344CB8AC3E}">
+        <p14:creationId xmlns:p14="http://schemas.microsoft.com/office/powerpoint/2010/main" val="2869867199"/>
+      </p:ext>
+    </p:extLst>
+  </p:cSld>
+  <p:clrMapOvr>
+    <a:masterClrMapping/>
+  </p:clrMapOvr>
+</p:sld>
+</file>
+
+<file path=ppt/slides/slide15.xml><?xml version="1.0" encoding="utf-8"?>
+<p:sld xmlns:a="http://schemas.openxmlformats.org/drawingml/2006/main" xmlns:r="http://schemas.openxmlformats.org/officeDocument/2006/relationships" xmlns:p="http://schemas.openxmlformats.org/presentationml/2006/main">
+  <p:cSld>
+    <p:spTree>
+      <p:nvGrpSpPr>
+        <p:cNvPr id="1" name=""/>
+        <p:cNvGrpSpPr/>
+        <p:nvPr/>
+      </p:nvGrpSpPr>
+      <p:grpSpPr>
+        <a:xfrm>
+          <a:off x="0" y="0"/>
+          <a:ext cx="0" cy="0"/>
+          <a:chOff x="0" y="0"/>
+          <a:chExt cx="0" cy="0"/>
+        </a:xfrm>
+      </p:grpSpPr>
+      <p:sp>
+        <p:nvSpPr>
+          <p:cNvPr id="2" name="Title 1"/>
+          <p:cNvSpPr>
+            <a:spLocks noGrp="1"/>
+          </p:cNvSpPr>
+          <p:nvPr>
+            <p:ph type="title"/>
+          </p:nvPr>
+        </p:nvSpPr>
+        <p:spPr/>
+        <p:txBody>
+          <a:bodyPr/>
+          <a:lstStyle/>
+          <a:p>
+            <a:r>
+              <a:rPr lang="en-US" dirty="0" smtClean="0"/>
+              <a:t>Done. Crop </a:t>
+            </a:r>
+            <a:r>
+              <a:rPr lang="en-US" smtClean="0"/>
+              <a:t>rotation reduces weeds by ~50%. </a:t>
+            </a:r>
+            <a:endParaRPr lang="en-US" dirty="0"/>
+          </a:p>
+        </p:txBody>
+      </p:sp>
+      <p:pic>
+        <p:nvPicPr>
+          <p:cNvPr id="7" name="Picture 6"/>
+          <p:cNvPicPr>
+            <a:picLocks noChangeAspect="1"/>
+          </p:cNvPicPr>
+          <p:nvPr/>
+        </p:nvPicPr>
+        <p:blipFill>
+          <a:blip r:embed="rId2">
+            <a:extLst>
+              <a:ext uri="{28A0092B-C50C-407E-A947-70E740481C1C}">
+                <a14:useLocalDpi xmlns:a14="http://schemas.microsoft.com/office/drawing/2010/main" val="0"/>
+              </a:ext>
+            </a:extLst>
+          </a:blip>
+          <a:stretch>
+            <a:fillRect/>
+          </a:stretch>
+        </p:blipFill>
+        <p:spPr>
+          <a:xfrm>
+            <a:off x="2775005" y="1554815"/>
+            <a:ext cx="6476026" cy="4314652"/>
+          </a:xfrm>
+          <a:prstGeom prst="rect">
+            <a:avLst/>
+          </a:prstGeom>
+        </p:spPr>
+      </p:pic>
+    </p:spTree>
+    <p:extLst>
+      <p:ext uri="{BB962C8B-B14F-4D97-AF65-F5344CB8AC3E}">
+        <p14:creationId xmlns:p14="http://schemas.microsoft.com/office/powerpoint/2010/main" val="3963066721"/>
       </p:ext>
     </p:extLst>
   </p:cSld>
@@ -3244,9 +3688,10 @@
           <a:lstStyle/>
           <a:p>
             <a:r>
-              <a:rPr lang="en-US" dirty="0"/>
-              <a:t>Introduction</a:t>
-            </a:r>
+              <a:rPr lang="en-US" dirty="0" smtClean="0"/>
+              <a:t>Question:</a:t>
+            </a:r>
+            <a:endParaRPr lang="en-US" dirty="0"/>
           </a:p>
         </p:txBody>
       </p:sp>
@@ -3262,43 +3707,33 @@
         </p:nvSpPr>
         <p:spPr/>
         <p:txBody>
-          <a:bodyPr/>
-          <a:lstStyle/>
+          <a:bodyPr>
+            <a:normAutofit/>
+          </a:bodyPr>
+          <a:lstStyle/>
+          <a:p>
+            <a:r>
+              <a:rPr lang="en-US" sz="4800" dirty="0" smtClean="0"/>
+              <a:t>Are </a:t>
+            </a:r>
+            <a:r>
+              <a:rPr lang="en-US" sz="4800" dirty="0" smtClean="0"/>
+              <a:t>longer</a:t>
+            </a:r>
+            <a:r>
+              <a:rPr lang="en-US" sz="4800" dirty="0" smtClean="0"/>
+              <a:t> </a:t>
+            </a:r>
+            <a:r>
+              <a:rPr lang="en-US" sz="4800" dirty="0"/>
+              <a:t>crop rotations associated with less weed pressure?</a:t>
+            </a:r>
+          </a:p>
           <a:p>
             <a:pPr marL="0" indent="0">
               <a:buNone/>
             </a:pPr>
-            <a:r>
-              <a:rPr lang="en-US" dirty="0"/>
-              <a:t>Question:</a:t>
-            </a:r>
-          </a:p>
-          <a:p>
-            <a:r>
-              <a:rPr lang="en-US" dirty="0"/>
-              <a:t>Are extended crop rotations associated with less weed pressure?</a:t>
-            </a:r>
-          </a:p>
-          <a:p>
-            <a:pPr marL="0" indent="0">
-              <a:buNone/>
-            </a:pPr>
-            <a:endParaRPr lang="en-US" dirty="0"/>
-          </a:p>
-          <a:p>
-            <a:pPr marL="0" indent="0">
-              <a:buNone/>
-            </a:pPr>
-            <a:r>
-              <a:rPr lang="en-US" dirty="0"/>
-              <a:t>Why should you care?</a:t>
-            </a:r>
-          </a:p>
-          <a:p>
-            <a:r>
-              <a:rPr lang="en-US" dirty="0"/>
-              <a:t>Herbicides are really bad for ecosystems, and you. Plus, weeds are becoming resistant to our herbicides because we use them too heavily. We need other EFFECTIVE ways to reduce weeds. People THINK crop rotation reduces weeds, but no one has actually quantified it.  </a:t>
-            </a:r>
+            <a:endParaRPr lang="en-US" sz="4800" dirty="0"/>
           </a:p>
         </p:txBody>
       </p:sp>
@@ -3349,8 +3784,9 @@
           <a:p>
             <a:r>
               <a:rPr lang="en-US" dirty="0"/>
-              <a:t>Methods</a:t>
-            </a:r>
+              <a:t>Why should you care?</a:t>
+            </a:r>
+            <a:endParaRPr lang="en-US" dirty="0"/>
           </a:p>
         </p:txBody>
       </p:sp>
@@ -3369,39 +3805,61 @@
           <a:bodyPr/>
           <a:lstStyle/>
           <a:p>
+            <a:pPr marL="514350" indent="-514350">
+              <a:buAutoNum type="arabicPeriod"/>
+            </a:pPr>
+            <a:r>
+              <a:rPr lang="en-US" dirty="0" smtClean="0"/>
+              <a:t>Herbicides </a:t>
+            </a:r>
+            <a:r>
+              <a:rPr lang="en-US" dirty="0"/>
+              <a:t>are really bad for </a:t>
+            </a:r>
+            <a:r>
+              <a:rPr lang="en-US" dirty="0" smtClean="0"/>
+              <a:t>ecosystems</a:t>
+            </a:r>
+          </a:p>
+          <a:p>
+            <a:pPr marL="514350" indent="-514350">
+              <a:buAutoNum type="arabicPeriod"/>
+            </a:pPr>
+            <a:r>
+              <a:rPr lang="en-US" dirty="0" smtClean="0"/>
+              <a:t>Herbicides are probably bad for you</a:t>
+            </a:r>
+            <a:r>
+              <a:rPr lang="en-US" dirty="0"/>
+              <a:t>. </a:t>
+            </a:r>
+            <a:endParaRPr lang="en-US" dirty="0" smtClean="0"/>
+          </a:p>
+          <a:p>
+            <a:pPr marL="514350" indent="-514350">
+              <a:buAutoNum type="arabicPeriod"/>
+            </a:pPr>
+            <a:r>
+              <a:rPr lang="en-US" dirty="0" smtClean="0"/>
+              <a:t>Weeds </a:t>
+            </a:r>
+            <a:r>
+              <a:rPr lang="en-US" dirty="0"/>
+              <a:t>are becoming resistant to our herbicides because we use them too heavily. </a:t>
+            </a:r>
+            <a:endParaRPr lang="en-US" dirty="0" smtClean="0"/>
+          </a:p>
+          <a:p>
             <a:pPr marL="0" indent="0">
               <a:buNone/>
             </a:pPr>
             <a:r>
+              <a:rPr lang="en-US" dirty="0" smtClean="0"/>
+              <a:t>We </a:t>
+            </a:r>
+            <a:r>
               <a:rPr lang="en-US" dirty="0"/>
-              <a:t>How did you test your question?  </a:t>
-            </a:r>
-          </a:p>
-          <a:p>
-            <a:r>
-              <a:rPr lang="en-US" dirty="0"/>
-              <a:t>Searched the literature for studies that report weed density or weed biomass different crop rotations. </a:t>
-            </a:r>
-          </a:p>
-          <a:p>
-            <a:r>
-              <a:rPr lang="en-US" dirty="0"/>
-              <a:t>Converted data into a response ratio:</a:t>
-            </a:r>
-          </a:p>
-          <a:p>
-            <a:pPr marL="457200" lvl="1" indent="0">
-              <a:buNone/>
-            </a:pPr>
-            <a:r>
-              <a:rPr lang="en-US" dirty="0"/>
-              <a:t>weeds in long rotation / weeds in short rotation</a:t>
-            </a:r>
-          </a:p>
-          <a:p>
-            <a:r>
-              <a:rPr lang="en-US" dirty="0"/>
-              <a:t>Recorded potential modifier values</a:t>
+              <a:t>need other EFFECTIVE ways to reduce weeds. People THINK crop rotation reduces weeds, but no one has actually quantified it.  </a:t>
             </a:r>
           </a:p>
           <a:p>
@@ -3415,7 +3873,7 @@
     </p:spTree>
     <p:extLst>
       <p:ext uri="{BB962C8B-B14F-4D97-AF65-F5344CB8AC3E}">
-        <p14:creationId xmlns:p14="http://schemas.microsoft.com/office/powerpoint/2010/main" val="100775222"/>
+        <p14:creationId xmlns:p14="http://schemas.microsoft.com/office/powerpoint/2010/main" val="3204146421"/>
       </p:ext>
     </p:extLst>
   </p:cSld>
@@ -3457,6 +3915,306 @@
           <a:bodyPr/>
           <a:lstStyle/>
           <a:p>
+            <a:endParaRPr lang="en-US"/>
+          </a:p>
+        </p:txBody>
+      </p:sp>
+      <p:pic>
+        <p:nvPicPr>
+          <p:cNvPr id="7" name="Picture 6"/>
+          <p:cNvPicPr>
+            <a:picLocks noChangeAspect="1"/>
+          </p:cNvPicPr>
+          <p:nvPr/>
+        </p:nvPicPr>
+        <p:blipFill>
+          <a:blip r:embed="rId2">
+            <a:extLst>
+              <a:ext uri="{28A0092B-C50C-407E-A947-70E740481C1C}">
+                <a14:useLocalDpi xmlns:a14="http://schemas.microsoft.com/office/drawing/2010/main" val="0"/>
+              </a:ext>
+            </a:extLst>
+          </a:blip>
+          <a:stretch>
+            <a:fillRect/>
+          </a:stretch>
+        </p:blipFill>
+        <p:spPr>
+          <a:xfrm>
+            <a:off x="267319" y="222002"/>
+            <a:ext cx="6185086" cy="3285827"/>
+          </a:xfrm>
+          <a:prstGeom prst="rect">
+            <a:avLst/>
+          </a:prstGeom>
+        </p:spPr>
+      </p:pic>
+      <p:pic>
+        <p:nvPicPr>
+          <p:cNvPr id="6" name="Content Placeholder 5"/>
+          <p:cNvPicPr>
+            <a:picLocks noGrp="1" noChangeAspect="1"/>
+          </p:cNvPicPr>
+          <p:nvPr>
+            <p:ph idx="1"/>
+          </p:nvPr>
+        </p:nvPicPr>
+        <p:blipFill>
+          <a:blip r:embed="rId3">
+            <a:extLst>
+              <a:ext uri="{28A0092B-C50C-407E-A947-70E740481C1C}">
+                <a14:useLocalDpi xmlns:a14="http://schemas.microsoft.com/office/drawing/2010/main" val="0"/>
+              </a:ext>
+            </a:extLst>
+          </a:blip>
+          <a:stretch>
+            <a:fillRect/>
+          </a:stretch>
+        </p:blipFill>
+        <p:spPr>
+          <a:xfrm>
+            <a:off x="5747800" y="2779801"/>
+            <a:ext cx="5757075" cy="3032060"/>
+          </a:xfrm>
+        </p:spPr>
+      </p:pic>
+      <p:sp>
+        <p:nvSpPr>
+          <p:cNvPr id="8" name="Rectangle 7"/>
+          <p:cNvSpPr/>
+          <p:nvPr/>
+        </p:nvSpPr>
+        <p:spPr>
+          <a:xfrm>
+            <a:off x="267319" y="3266691"/>
+            <a:ext cx="6096000" cy="253916"/>
+          </a:xfrm>
+          <a:prstGeom prst="rect">
+            <a:avLst/>
+          </a:prstGeom>
+        </p:spPr>
+        <p:txBody>
+          <a:bodyPr>
+            <a:spAutoFit/>
+          </a:bodyPr>
+          <a:lstStyle/>
+          <a:p>
+            <a:r>
+              <a:rPr lang="en-US" sz="1000" smtClean="0"/>
+              <a:t>https://www.wakingtimes.com/2016/11/18/banned-eu-dangerous-chemical-americans/atrazine-frog-usa/</a:t>
+            </a:r>
+            <a:endParaRPr lang="en-US" sz="1000" dirty="0"/>
+          </a:p>
+        </p:txBody>
+      </p:sp>
+      <p:sp>
+        <p:nvSpPr>
+          <p:cNvPr id="9" name="Rectangle 8"/>
+          <p:cNvSpPr/>
+          <p:nvPr/>
+        </p:nvSpPr>
+        <p:spPr>
+          <a:xfrm>
+            <a:off x="5731898" y="5820594"/>
+            <a:ext cx="6096000" cy="261610"/>
+          </a:xfrm>
+          <a:prstGeom prst="rect">
+            <a:avLst/>
+          </a:prstGeom>
+        </p:spPr>
+        <p:txBody>
+          <a:bodyPr>
+            <a:spAutoFit/>
+          </a:bodyPr>
+          <a:lstStyle/>
+          <a:p>
+            <a:r>
+              <a:rPr lang="en-US" sz="1100" dirty="0"/>
+              <a:t>https://www.no-tillfarmer.com/articles/5057-rising-pigweed-presence-in-soybeans</a:t>
+            </a:r>
+          </a:p>
+        </p:txBody>
+      </p:sp>
+    </p:spTree>
+    <p:extLst>
+      <p:ext uri="{BB962C8B-B14F-4D97-AF65-F5344CB8AC3E}">
+        <p14:creationId xmlns:p14="http://schemas.microsoft.com/office/powerpoint/2010/main" val="3088851082"/>
+      </p:ext>
+    </p:extLst>
+  </p:cSld>
+  <p:clrMapOvr>
+    <a:masterClrMapping/>
+  </p:clrMapOvr>
+</p:sld>
+</file>
+
+<file path=ppt/slides/slide5.xml><?xml version="1.0" encoding="utf-8"?>
+<p:sld xmlns:a="http://schemas.openxmlformats.org/drawingml/2006/main" xmlns:r="http://schemas.openxmlformats.org/officeDocument/2006/relationships" xmlns:p="http://schemas.openxmlformats.org/presentationml/2006/main">
+  <p:cSld>
+    <p:spTree>
+      <p:nvGrpSpPr>
+        <p:cNvPr id="1" name=""/>
+        <p:cNvGrpSpPr/>
+        <p:nvPr/>
+      </p:nvGrpSpPr>
+      <p:grpSpPr>
+        <a:xfrm>
+          <a:off x="0" y="0"/>
+          <a:ext cx="0" cy="0"/>
+          <a:chOff x="0" y="0"/>
+          <a:chExt cx="0" cy="0"/>
+        </a:xfrm>
+      </p:grpSpPr>
+      <p:sp>
+        <p:nvSpPr>
+          <p:cNvPr id="2" name="Title 1"/>
+          <p:cNvSpPr>
+            <a:spLocks noGrp="1"/>
+          </p:cNvSpPr>
+          <p:nvPr>
+            <p:ph type="title"/>
+          </p:nvPr>
+        </p:nvSpPr>
+        <p:spPr/>
+        <p:txBody>
+          <a:bodyPr/>
+          <a:lstStyle/>
+          <a:p>
+            <a:r>
+              <a:rPr lang="en-US" dirty="0"/>
+              <a:t>Methods</a:t>
+            </a:r>
+          </a:p>
+        </p:txBody>
+      </p:sp>
+      <p:sp>
+        <p:nvSpPr>
+          <p:cNvPr id="3" name="Content Placeholder 2"/>
+          <p:cNvSpPr>
+            <a:spLocks noGrp="1"/>
+          </p:cNvSpPr>
+          <p:nvPr>
+            <p:ph idx="1"/>
+          </p:nvPr>
+        </p:nvSpPr>
+        <p:spPr/>
+        <p:txBody>
+          <a:bodyPr/>
+          <a:lstStyle/>
+          <a:p>
+            <a:pPr marL="0" indent="0">
+              <a:buNone/>
+            </a:pPr>
+            <a:r>
+              <a:rPr lang="en-US" dirty="0"/>
+              <a:t>How did you test your question?  </a:t>
+            </a:r>
+            <a:endParaRPr lang="en-US" dirty="0" smtClean="0"/>
+          </a:p>
+          <a:p>
+            <a:pPr marL="0" indent="0">
+              <a:buNone/>
+            </a:pPr>
+            <a:endParaRPr lang="en-US" dirty="0"/>
+          </a:p>
+          <a:p>
+            <a:r>
+              <a:rPr lang="en-US" dirty="0"/>
+              <a:t>Searched the literature for studies that report weed density or weed biomass </a:t>
+            </a:r>
+            <a:r>
+              <a:rPr lang="en-US" dirty="0" smtClean="0"/>
+              <a:t>under different </a:t>
+            </a:r>
+            <a:r>
+              <a:rPr lang="en-US" dirty="0"/>
+              <a:t>crop </a:t>
+            </a:r>
+            <a:r>
+              <a:rPr lang="en-US" dirty="0" smtClean="0"/>
+              <a:t>rotations (paired data). </a:t>
+            </a:r>
+            <a:endParaRPr lang="en-US" dirty="0"/>
+          </a:p>
+          <a:p>
+            <a:r>
+              <a:rPr lang="en-US" dirty="0"/>
+              <a:t>Converted data into a response ratio:</a:t>
+            </a:r>
+          </a:p>
+          <a:p>
+            <a:pPr marL="457200" lvl="1" indent="0">
+              <a:buNone/>
+            </a:pPr>
+            <a:r>
+              <a:rPr lang="en-US" dirty="0"/>
+              <a:t>weeds in long rotation / weeds in short rotation</a:t>
+            </a:r>
+          </a:p>
+          <a:p>
+            <a:r>
+              <a:rPr lang="en-US" dirty="0"/>
+              <a:t>Recorded </a:t>
+            </a:r>
+            <a:r>
+              <a:rPr lang="en-US" dirty="0" smtClean="0"/>
+              <a:t>other management information thought to be pertinent based on previous literature/availability</a:t>
+            </a:r>
+            <a:endParaRPr lang="en-US" dirty="0"/>
+          </a:p>
+          <a:p>
+            <a:pPr marL="0" indent="0">
+              <a:buNone/>
+            </a:pPr>
+            <a:endParaRPr lang="en-US" dirty="0"/>
+          </a:p>
+        </p:txBody>
+      </p:sp>
+    </p:spTree>
+    <p:extLst>
+      <p:ext uri="{BB962C8B-B14F-4D97-AF65-F5344CB8AC3E}">
+        <p14:creationId xmlns:p14="http://schemas.microsoft.com/office/powerpoint/2010/main" val="100775222"/>
+      </p:ext>
+    </p:extLst>
+  </p:cSld>
+  <p:clrMapOvr>
+    <a:masterClrMapping/>
+  </p:clrMapOvr>
+</p:sld>
+</file>
+
+<file path=ppt/slides/slide6.xml><?xml version="1.0" encoding="utf-8"?>
+<p:sld xmlns:a="http://schemas.openxmlformats.org/drawingml/2006/main" xmlns:r="http://schemas.openxmlformats.org/officeDocument/2006/relationships" xmlns:p="http://schemas.openxmlformats.org/presentationml/2006/main">
+  <p:cSld>
+    <p:spTree>
+      <p:nvGrpSpPr>
+        <p:cNvPr id="1" name=""/>
+        <p:cNvGrpSpPr/>
+        <p:nvPr/>
+      </p:nvGrpSpPr>
+      <p:grpSpPr>
+        <a:xfrm>
+          <a:off x="0" y="0"/>
+          <a:ext cx="0" cy="0"/>
+          <a:chOff x="0" y="0"/>
+          <a:chExt cx="0" cy="0"/>
+        </a:xfrm>
+      </p:grpSpPr>
+      <p:sp>
+        <p:nvSpPr>
+          <p:cNvPr id="2" name="Title 1"/>
+          <p:cNvSpPr>
+            <a:spLocks noGrp="1"/>
+          </p:cNvSpPr>
+          <p:nvPr>
+            <p:ph type="title"/>
+          </p:nvPr>
+        </p:nvSpPr>
+        <p:spPr/>
+        <p:txBody>
+          <a:bodyPr/>
+          <a:lstStyle/>
+          <a:p>
             <a:r>
               <a:rPr lang="en-US" dirty="0"/>
               <a:t>Methods</a:t>
@@ -3480,7 +4238,7 @@
             <p:ph idx="1"/>
             <p:extLst>
               <p:ext uri="{D42A27DB-BD31-4B8C-83A1-F6EECF244321}">
-                <p14:modId xmlns:p14="http://schemas.microsoft.com/office/powerpoint/2010/main" val="1337927561"/>
+                <p14:modId xmlns:p14="http://schemas.microsoft.com/office/powerpoint/2010/main" val="2169240633"/>
               </p:ext>
             </p:extLst>
           </p:nvPr>
@@ -3727,15 +4485,24 @@
                         </a:spcAft>
                       </a:pPr>
                       <a:r>
-                        <a:rPr lang="en-US" sz="2000">
+                        <a:rPr lang="en-US" sz="2000" dirty="0">
                           <a:solidFill>
                             <a:schemeClr val="tx1"/>
                           </a:solidFill>
                           <a:effectLst/>
                         </a:rPr>
-                        <a:t>Herbicides, mechanical only, none</a:t>
+                        <a:t>Herbicides, </a:t>
                       </a:r>
-                      <a:endParaRPr lang="en-US" sz="1800">
+                      <a:r>
+                        <a:rPr lang="en-US" sz="2000" dirty="0" smtClean="0">
+                          <a:solidFill>
+                            <a:schemeClr val="tx1"/>
+                          </a:solidFill>
+                          <a:effectLst/>
+                        </a:rPr>
+                        <a:t>other</a:t>
+                      </a:r>
+                      <a:endParaRPr lang="en-US" sz="1800" dirty="0">
                         <a:solidFill>
                           <a:schemeClr val="tx1"/>
                         </a:solidFill>
@@ -4143,235 +4910,6 @@
 </p:sld>
 </file>
 
-<file path=ppt/slides/slide5.xml><?xml version="1.0" encoding="utf-8"?>
-<p:sld xmlns:a="http://schemas.openxmlformats.org/drawingml/2006/main" xmlns:r="http://schemas.openxmlformats.org/officeDocument/2006/relationships" xmlns:p="http://schemas.openxmlformats.org/presentationml/2006/main">
-  <p:cSld>
-    <p:spTree>
-      <p:nvGrpSpPr>
-        <p:cNvPr id="1" name=""/>
-        <p:cNvGrpSpPr/>
-        <p:nvPr/>
-      </p:nvGrpSpPr>
-      <p:grpSpPr>
-        <a:xfrm>
-          <a:off x="0" y="0"/>
-          <a:ext cx="0" cy="0"/>
-          <a:chOff x="0" y="0"/>
-          <a:chExt cx="0" cy="0"/>
-        </a:xfrm>
-      </p:grpSpPr>
-      <p:sp>
-        <p:nvSpPr>
-          <p:cNvPr id="2" name="Title 1"/>
-          <p:cNvSpPr>
-            <a:spLocks noGrp="1"/>
-          </p:cNvSpPr>
-          <p:nvPr>
-            <p:ph type="title"/>
-          </p:nvPr>
-        </p:nvSpPr>
-        <p:spPr/>
-        <p:txBody>
-          <a:bodyPr/>
-          <a:lstStyle/>
-          <a:p>
-            <a:r>
-              <a:rPr lang="en-US" dirty="0"/>
-              <a:t>Analysis (~3 slides)</a:t>
-            </a:r>
-          </a:p>
-        </p:txBody>
-      </p:sp>
-      <p:sp>
-        <p:nvSpPr>
-          <p:cNvPr id="3" name="Content Placeholder 2"/>
-          <p:cNvSpPr>
-            <a:spLocks noGrp="1"/>
-          </p:cNvSpPr>
-          <p:nvPr>
-            <p:ph idx="1"/>
-          </p:nvPr>
-        </p:nvSpPr>
-        <p:spPr/>
-        <p:txBody>
-          <a:bodyPr>
-            <a:normAutofit/>
-          </a:bodyPr>
-          <a:lstStyle/>
-          <a:p>
-            <a:r>
-              <a:rPr lang="en-US" dirty="0"/>
-              <a:t>Took natural log of response ratio (LRR)</a:t>
-            </a:r>
-          </a:p>
-          <a:p>
-            <a:r>
-              <a:rPr lang="en-US" dirty="0"/>
-              <a:t>Two types of models</a:t>
-            </a:r>
-          </a:p>
-          <a:p>
-            <a:pPr lvl="1"/>
-            <a:r>
-              <a:rPr lang="en-US" dirty="0"/>
-              <a:t>Used a mixed model with study as a random effect, weighted by number of replicates</a:t>
-            </a:r>
-          </a:p>
-          <a:p>
-            <a:pPr lvl="1"/>
-            <a:r>
-              <a:rPr lang="en-US" dirty="0"/>
-              <a:t>Used a mixed model with modifier as a fixed effect, and study as a random effect, weighted by number of replicates</a:t>
-            </a:r>
-          </a:p>
-          <a:p>
-            <a:r>
-              <a:rPr lang="en-US" dirty="0"/>
-              <a:t>Formula:</a:t>
-            </a:r>
-          </a:p>
-          <a:p>
-            <a:pPr marL="0" indent="0">
-              <a:buNone/>
-            </a:pPr>
-            <a:r>
-              <a:rPr lang="en-US" dirty="0"/>
-              <a:t> (1) LRR ~ B0 + a*study</a:t>
-            </a:r>
-          </a:p>
-          <a:p>
-            <a:pPr marL="0" indent="0">
-              <a:buNone/>
-            </a:pPr>
-            <a:r>
-              <a:rPr lang="en-US" dirty="0"/>
-              <a:t> (2) LRR ~ B0 + B1*x1 + a*study</a:t>
-            </a:r>
-          </a:p>
-        </p:txBody>
-      </p:sp>
-    </p:spTree>
-    <p:extLst>
-      <p:ext uri="{BB962C8B-B14F-4D97-AF65-F5344CB8AC3E}">
-        <p14:creationId xmlns:p14="http://schemas.microsoft.com/office/powerpoint/2010/main" val="589861561"/>
-      </p:ext>
-    </p:extLst>
-  </p:cSld>
-  <p:clrMapOvr>
-    <a:masterClrMapping/>
-  </p:clrMapOvr>
-</p:sld>
-</file>
-
-<file path=ppt/slides/slide6.xml><?xml version="1.0" encoding="utf-8"?>
-<p:sld xmlns:a="http://schemas.openxmlformats.org/drawingml/2006/main" xmlns:r="http://schemas.openxmlformats.org/officeDocument/2006/relationships" xmlns:p="http://schemas.openxmlformats.org/presentationml/2006/main">
-  <p:cSld>
-    <p:spTree>
-      <p:nvGrpSpPr>
-        <p:cNvPr id="1" name=""/>
-        <p:cNvGrpSpPr/>
-        <p:nvPr/>
-      </p:nvGrpSpPr>
-      <p:grpSpPr>
-        <a:xfrm>
-          <a:off x="0" y="0"/>
-          <a:ext cx="0" cy="0"/>
-          <a:chOff x="0" y="0"/>
-          <a:chExt cx="0" cy="0"/>
-        </a:xfrm>
-      </p:grpSpPr>
-      <p:sp>
-        <p:nvSpPr>
-          <p:cNvPr id="2" name="Title 1"/>
-          <p:cNvSpPr>
-            <a:spLocks noGrp="1"/>
-          </p:cNvSpPr>
-          <p:nvPr>
-            <p:ph type="title"/>
-          </p:nvPr>
-        </p:nvSpPr>
-        <p:spPr/>
-        <p:txBody>
-          <a:bodyPr/>
-          <a:lstStyle/>
-          <a:p>
-            <a:r>
-              <a:rPr lang="en-US" dirty="0"/>
-              <a:t>Analysis (~3 slides)</a:t>
-            </a:r>
-          </a:p>
-        </p:txBody>
-      </p:sp>
-      <p:sp>
-        <p:nvSpPr>
-          <p:cNvPr id="3" name="Content Placeholder 2"/>
-          <p:cNvSpPr>
-            <a:spLocks noGrp="1"/>
-          </p:cNvSpPr>
-          <p:nvPr>
-            <p:ph idx="1"/>
-          </p:nvPr>
-        </p:nvSpPr>
-        <p:spPr/>
-        <p:txBody>
-          <a:bodyPr>
-            <a:normAutofit/>
-          </a:bodyPr>
-          <a:lstStyle/>
-          <a:p>
-            <a:r>
-              <a:rPr lang="en-US" dirty="0"/>
-              <a:t>How did you assess significance/importance of predictors? </a:t>
-            </a:r>
-          </a:p>
-          <a:p>
-            <a:r>
-              <a:rPr lang="en-US" dirty="0"/>
-              <a:t>Three methods for looking at modifiers:</a:t>
-            </a:r>
-          </a:p>
-          <a:p>
-            <a:pPr marL="514350" indent="-514350">
-              <a:buAutoNum type="arabicPeriod"/>
-            </a:pPr>
-            <a:r>
-              <a:rPr lang="en-US" dirty="0"/>
-              <a:t>Looking at overall effects (w/o accounting for modifiers)</a:t>
-            </a:r>
-          </a:p>
-          <a:p>
-            <a:pPr marL="514350" indent="-514350">
-              <a:buAutoNum type="arabicPeriod"/>
-            </a:pPr>
-            <a:r>
-              <a:rPr lang="en-US" dirty="0"/>
-              <a:t>See if either of modifier levels were significantly different from 0 (99% confidence intervals)</a:t>
-            </a:r>
-          </a:p>
-          <a:p>
-            <a:pPr marL="514350" indent="-514350">
-              <a:buAutoNum type="arabicPeriod"/>
-            </a:pPr>
-            <a:r>
-              <a:rPr lang="en-US" dirty="0"/>
-              <a:t>See if modifier levels were significantly different from each other</a:t>
-            </a:r>
-          </a:p>
-        </p:txBody>
-      </p:sp>
-    </p:spTree>
-    <p:extLst>
-      <p:ext uri="{BB962C8B-B14F-4D97-AF65-F5344CB8AC3E}">
-        <p14:creationId xmlns:p14="http://schemas.microsoft.com/office/powerpoint/2010/main" val="2562867819"/>
-      </p:ext>
-    </p:extLst>
-  </p:cSld>
-  <p:clrMapOvr>
-    <a:masterClrMapping/>
-  </p:clrMapOvr>
-</p:sld>
-</file>
-
 <file path=ppt/slides/slide7.xml><?xml version="1.0" encoding="utf-8"?>
 <p:sld xmlns:a="http://schemas.openxmlformats.org/drawingml/2006/main" xmlns:r="http://schemas.openxmlformats.org/officeDocument/2006/relationships" xmlns:p="http://schemas.openxmlformats.org/presentationml/2006/main">
   <p:cSld>
@@ -4405,9 +4943,10 @@
           <a:lstStyle/>
           <a:p>
             <a:r>
-              <a:rPr lang="en-US" dirty="0"/>
-              <a:t>Analysis packages</a:t>
-            </a:r>
+              <a:rPr lang="en-US" dirty="0" smtClean="0"/>
+              <a:t>Analysis - models</a:t>
+            </a:r>
+            <a:endParaRPr lang="en-US" dirty="0"/>
           </a:p>
         </p:txBody>
       </p:sp>
@@ -4429,59 +4968,82 @@
           <a:lstStyle/>
           <a:p>
             <a:r>
+              <a:rPr lang="en-US" dirty="0" smtClean="0"/>
+              <a:t>Transformed data - took </a:t>
+            </a:r>
+            <a:r>
               <a:rPr lang="en-US" dirty="0"/>
-              <a:t>Used lme4 package</a:t>
+              <a:t>natural log of response ratio (LRR)</a:t>
+            </a:r>
+          </a:p>
+          <a:p>
+            <a:r>
+              <a:rPr lang="en-US" dirty="0"/>
+              <a:t>Two types of models</a:t>
             </a:r>
           </a:p>
           <a:p>
             <a:pPr lvl="1"/>
             <a:r>
-              <a:rPr lang="en-US" dirty="0" err="1"/>
-              <a:t>lmer</a:t>
-            </a:r>
-            <a:r>
               <a:rPr lang="en-US" dirty="0"/>
-              <a:t> function for model fitting</a:t>
-            </a:r>
-          </a:p>
-          <a:p>
+              <a:t>Used a mixed model with study as a random effect, weighted by number of replicates</a:t>
+            </a:r>
+          </a:p>
+          <a:p>
+            <a:pPr lvl="1"/>
             <a:r>
               <a:rPr lang="en-US" dirty="0"/>
-              <a:t>Used </a:t>
-            </a:r>
-            <a:r>
-              <a:rPr lang="en-US" dirty="0" err="1"/>
-              <a:t>emmeans</a:t>
-            </a:r>
+              <a:t>Used a mixed model with modifier as a fixed effect, and study as a random effect, weighted by number of replicates</a:t>
+            </a:r>
+          </a:p>
+          <a:p>
             <a:r>
               <a:rPr lang="en-US" dirty="0"/>
-              <a:t> package</a:t>
-            </a:r>
-          </a:p>
-          <a:p>
-            <a:pPr lvl="1"/>
-            <a:r>
-              <a:rPr lang="en-US" dirty="0" err="1"/>
-              <a:t>Emmeans</a:t>
-            </a:r>
+              <a:t>Formula:</a:t>
+            </a:r>
+          </a:p>
+          <a:p>
+            <a:pPr marL="0" indent="0">
+              <a:buNone/>
+            </a:pPr>
             <a:r>
               <a:rPr lang="en-US" dirty="0"/>
-              <a:t> function for confidence intervals and p-values</a:t>
-            </a:r>
-          </a:p>
-          <a:p>
-            <a:pPr lvl="1"/>
+              <a:t> (1) LRR ~ B0 + </a:t>
+            </a:r>
+            <a:r>
+              <a:rPr lang="en-US" i="1" dirty="0" smtClean="0"/>
+              <a:t>study</a:t>
+            </a:r>
+            <a:endParaRPr lang="en-US" i="1" dirty="0"/>
+          </a:p>
+          <a:p>
+            <a:pPr marL="0" indent="0">
+              <a:buNone/>
+            </a:pPr>
             <a:r>
               <a:rPr lang="en-US" dirty="0"/>
-              <a:t>Pairs function for comparisons between modifier levels</a:t>
-            </a:r>
+              <a:t> (2) LRR ~ B0 + </a:t>
+            </a:r>
+            <a:r>
+              <a:rPr lang="en-US" dirty="0" smtClean="0"/>
+              <a:t>mod1*x </a:t>
+            </a:r>
+            <a:r>
+              <a:rPr lang="en-US" dirty="0"/>
+              <a:t>+ </a:t>
+            </a:r>
+            <a:r>
+              <a:rPr lang="en-US" i="1" dirty="0" smtClean="0"/>
+              <a:t>study</a:t>
+            </a:r>
+            <a:endParaRPr lang="en-US" i="1" dirty="0"/>
           </a:p>
         </p:txBody>
       </p:sp>
     </p:spTree>
     <p:extLst>
       <p:ext uri="{BB962C8B-B14F-4D97-AF65-F5344CB8AC3E}">
-        <p14:creationId xmlns:p14="http://schemas.microsoft.com/office/powerpoint/2010/main" val="2767390860"/>
+        <p14:creationId xmlns:p14="http://schemas.microsoft.com/office/powerpoint/2010/main" val="589861561"/>
       </p:ext>
     </p:extLst>
   </p:cSld>
@@ -4524,68 +5086,98 @@
           <a:lstStyle/>
           <a:p>
             <a:r>
+              <a:rPr lang="en-US" dirty="0" smtClean="0"/>
+              <a:t>Analysis - significance</a:t>
+            </a:r>
+            <a:endParaRPr lang="en-US" dirty="0"/>
+          </a:p>
+        </p:txBody>
+      </p:sp>
+      <p:sp>
+        <p:nvSpPr>
+          <p:cNvPr id="3" name="Content Placeholder 2"/>
+          <p:cNvSpPr>
+            <a:spLocks noGrp="1"/>
+          </p:cNvSpPr>
+          <p:nvPr>
+            <p:ph idx="1"/>
+          </p:nvPr>
+        </p:nvSpPr>
+        <p:spPr/>
+        <p:txBody>
+          <a:bodyPr>
+            <a:normAutofit/>
+          </a:bodyPr>
+          <a:lstStyle/>
+          <a:p>
+            <a:pPr marL="0" indent="0">
+              <a:buNone/>
+            </a:pPr>
+            <a:r>
+              <a:rPr lang="en-US" dirty="0" smtClean="0"/>
+              <a:t>Three methods:</a:t>
+            </a:r>
+            <a:endParaRPr lang="en-US" dirty="0"/>
+          </a:p>
+          <a:p>
+            <a:pPr marL="514350" indent="-514350">
+              <a:buAutoNum type="arabicPeriod"/>
+            </a:pPr>
+            <a:r>
+              <a:rPr lang="en-US" dirty="0" smtClean="0"/>
+              <a:t>Overall effects different (p&lt;0.01) from 0?</a:t>
+            </a:r>
+            <a:endParaRPr lang="en-US" dirty="0"/>
+          </a:p>
+          <a:p>
+            <a:pPr marL="514350" indent="-514350">
+              <a:buAutoNum type="arabicPeriod"/>
+            </a:pPr>
+            <a:r>
+              <a:rPr lang="en-US" dirty="0" smtClean="0"/>
+              <a:t>Single modifier </a:t>
+            </a:r>
+            <a:r>
+              <a:rPr lang="en-US" dirty="0" smtClean="0"/>
+              <a:t>levels different (p&lt;0.01) from 0?</a:t>
+            </a:r>
+            <a:r>
+              <a:rPr lang="en-US" dirty="0" smtClean="0"/>
+              <a:t> </a:t>
+            </a:r>
+          </a:p>
+          <a:p>
+            <a:pPr marL="514350" indent="-514350">
+              <a:buAutoNum type="arabicPeriod"/>
+            </a:pPr>
+            <a:r>
+              <a:rPr lang="en-US" dirty="0" smtClean="0"/>
+              <a:t>Modifier </a:t>
+            </a:r>
+            <a:r>
               <a:rPr lang="en-US" dirty="0"/>
-              <a:t>Results - database</a:t>
-            </a:r>
-          </a:p>
-        </p:txBody>
-      </p:sp>
-      <p:sp>
-        <p:nvSpPr>
-          <p:cNvPr id="3" name="Content Placeholder 2"/>
-          <p:cNvSpPr>
-            <a:spLocks noGrp="1"/>
-          </p:cNvSpPr>
-          <p:nvPr>
-            <p:ph idx="1"/>
-          </p:nvPr>
-        </p:nvSpPr>
-        <p:spPr/>
-        <p:txBody>
-          <a:bodyPr/>
-          <a:lstStyle/>
-          <a:p>
-            <a:pPr marL="0" indent="0">
-              <a:buNone/>
-            </a:pPr>
+              <a:t>levels </a:t>
+            </a:r>
+            <a:r>
+              <a:rPr lang="en-US" dirty="0" smtClean="0"/>
+              <a:t>different (p&lt;0.01) from </a:t>
+            </a:r>
+            <a:r>
+              <a:rPr lang="en-US" dirty="0"/>
+              <a:t>each </a:t>
+            </a:r>
+            <a:r>
+              <a:rPr lang="en-US" dirty="0" smtClean="0"/>
+              <a:t>other?</a:t>
+            </a:r>
             <a:endParaRPr lang="en-US" dirty="0"/>
           </a:p>
         </p:txBody>
       </p:sp>
-      <p:pic>
-        <p:nvPicPr>
-          <p:cNvPr id="5" name="Picture 4">
-            <a:extLst>
-              <a:ext uri="{FF2B5EF4-FFF2-40B4-BE49-F238E27FC236}">
-                <a16:creationId xmlns:a16="http://schemas.microsoft.com/office/drawing/2014/main" id="{AF189CEC-455A-4B5F-AE66-D31784518782}"/>
-              </a:ext>
-            </a:extLst>
-          </p:cNvPr>
-          <p:cNvPicPr>
-            <a:picLocks noChangeAspect="1"/>
-          </p:cNvPicPr>
-          <p:nvPr/>
-        </p:nvPicPr>
-        <p:blipFill>
-          <a:blip r:embed="rId2"/>
-          <a:stretch>
-            <a:fillRect/>
-          </a:stretch>
-        </p:blipFill>
-        <p:spPr>
-          <a:xfrm>
-            <a:off x="1932395" y="1690688"/>
-            <a:ext cx="7853761" cy="5048846"/>
-          </a:xfrm>
-          <a:prstGeom prst="rect">
-            <a:avLst/>
-          </a:prstGeom>
-        </p:spPr>
-      </p:pic>
     </p:spTree>
     <p:extLst>
       <p:ext uri="{BB962C8B-B14F-4D97-AF65-F5344CB8AC3E}">
-        <p14:creationId xmlns:p14="http://schemas.microsoft.com/office/powerpoint/2010/main" val="760348242"/>
+        <p14:creationId xmlns:p14="http://schemas.microsoft.com/office/powerpoint/2010/main" val="2562867819"/>
       </p:ext>
     </p:extLst>
   </p:cSld>
@@ -4628,38 +5220,131 @@
           <a:lstStyle/>
           <a:p>
             <a:r>
+              <a:rPr lang="en-US" dirty="0" smtClean="0"/>
+              <a:t>Analysis - packages</a:t>
+            </a:r>
+            <a:endParaRPr lang="en-US" dirty="0"/>
+          </a:p>
+        </p:txBody>
+      </p:sp>
+      <p:sp>
+        <p:nvSpPr>
+          <p:cNvPr id="3" name="Content Placeholder 2"/>
+          <p:cNvSpPr>
+            <a:spLocks noGrp="1"/>
+          </p:cNvSpPr>
+          <p:nvPr>
+            <p:ph idx="1"/>
+          </p:nvPr>
+        </p:nvSpPr>
+        <p:spPr/>
+        <p:txBody>
+          <a:bodyPr>
+            <a:normAutofit/>
+          </a:bodyPr>
+          <a:lstStyle/>
+          <a:p>
+            <a:r>
+              <a:rPr lang="en-US" dirty="0" err="1"/>
+              <a:t>t</a:t>
+            </a:r>
+            <a:r>
+              <a:rPr lang="en-US" dirty="0" err="1" smtClean="0"/>
+              <a:t>idyverse</a:t>
+            </a:r>
+            <a:r>
+              <a:rPr lang="en-US" dirty="0" smtClean="0"/>
+              <a:t>, </a:t>
+            </a:r>
+            <a:r>
+              <a:rPr lang="en-US" dirty="0" err="1" smtClean="0"/>
+              <a:t>readxl</a:t>
+            </a:r>
+            <a:r>
+              <a:rPr lang="en-US" dirty="0" smtClean="0"/>
+              <a:t>, purr, and broom packages </a:t>
+            </a:r>
+          </a:p>
+          <a:p>
+            <a:pPr lvl="1"/>
+            <a:r>
+              <a:rPr lang="en-US" dirty="0" smtClean="0"/>
+              <a:t>data wrangling/figures</a:t>
+            </a:r>
+          </a:p>
+          <a:p>
+            <a:endParaRPr lang="en-US" dirty="0" smtClean="0"/>
+          </a:p>
+          <a:p>
+            <a:r>
+              <a:rPr lang="en-US" dirty="0" smtClean="0"/>
+              <a:t>lme4 </a:t>
+            </a:r>
+            <a:r>
               <a:rPr lang="en-US" dirty="0"/>
-              <a:t>Results – overall effects</a:t>
-            </a:r>
-          </a:p>
-        </p:txBody>
-      </p:sp>
-      <p:sp>
-        <p:nvSpPr>
-          <p:cNvPr id="3" name="Content Placeholder 2"/>
-          <p:cNvSpPr>
-            <a:spLocks noGrp="1"/>
-          </p:cNvSpPr>
-          <p:nvPr>
-            <p:ph idx="1"/>
-          </p:nvPr>
-        </p:nvSpPr>
-        <p:spPr/>
-        <p:txBody>
-          <a:bodyPr/>
-          <a:lstStyle/>
-          <a:p>
-            <a:pPr marL="0" indent="0">
-              <a:buNone/>
-            </a:pPr>
-            <a:endParaRPr lang="en-US" dirty="0"/>
+              <a:t>package</a:t>
+            </a:r>
+          </a:p>
+          <a:p>
+            <a:pPr lvl="1"/>
+            <a:r>
+              <a:rPr lang="en-US" dirty="0" err="1"/>
+              <a:t>lmer</a:t>
+            </a:r>
+            <a:r>
+              <a:rPr lang="en-US" dirty="0"/>
+              <a:t> function for </a:t>
+            </a:r>
+            <a:r>
+              <a:rPr lang="en-US" dirty="0" smtClean="0"/>
+              <a:t>mixed model </a:t>
+            </a:r>
+            <a:r>
+              <a:rPr lang="en-US" dirty="0"/>
+              <a:t>fitting</a:t>
+            </a:r>
+          </a:p>
+          <a:p>
+            <a:endParaRPr lang="en-US" dirty="0" smtClean="0"/>
+          </a:p>
+          <a:p>
+            <a:r>
+              <a:rPr lang="en-US" dirty="0" err="1" smtClean="0"/>
+              <a:t>emmeans</a:t>
+            </a:r>
+            <a:r>
+              <a:rPr lang="en-US" dirty="0" smtClean="0"/>
+              <a:t> </a:t>
+            </a:r>
+            <a:r>
+              <a:rPr lang="en-US" dirty="0"/>
+              <a:t>package</a:t>
+            </a:r>
+          </a:p>
+          <a:p>
+            <a:pPr lvl="1"/>
+            <a:r>
+              <a:rPr lang="en-US" dirty="0" err="1"/>
+              <a:t>Emmeans</a:t>
+            </a:r>
+            <a:r>
+              <a:rPr lang="en-US" dirty="0"/>
+              <a:t> function for confidence intervals and p-values</a:t>
+            </a:r>
+          </a:p>
+          <a:p>
+            <a:pPr lvl="1"/>
+            <a:r>
+              <a:rPr lang="en-US" dirty="0"/>
+              <a:t>Pairs function for comparisons between modifier levels</a:t>
+            </a:r>
           </a:p>
         </p:txBody>
       </p:sp>
     </p:spTree>
     <p:extLst>
       <p:ext uri="{BB962C8B-B14F-4D97-AF65-F5344CB8AC3E}">
-        <p14:creationId xmlns:p14="http://schemas.microsoft.com/office/powerpoint/2010/main" val="2225925255"/>
+        <p14:creationId xmlns:p14="http://schemas.microsoft.com/office/powerpoint/2010/main" val="2767390860"/>
       </p:ext>
     </p:extLst>
   </p:cSld>

</xml_diff>

<commit_message>
Update presentation, now it's black!
</commit_message>
<xml_diff>
--- a/Presentation_v1.pptx
+++ b/Presentation_v1.pptx
@@ -2,7 +2,7 @@
 <file path=ppt/presentation.xml><?xml version="1.0" encoding="utf-8"?>
 <p:presentation xmlns:a="http://schemas.openxmlformats.org/drawingml/2006/main" xmlns:r="http://schemas.openxmlformats.org/officeDocument/2006/relationships" xmlns:p="http://schemas.openxmlformats.org/presentationml/2006/main" saveSubsetFonts="1" autoCompressPictures="0">
   <p:sldMasterIdLst>
-    <p:sldMasterId id="2147483648" r:id="rId1"/>
+    <p:sldMasterId id="2147483660" r:id="rId1"/>
   </p:sldMasterIdLst>
   <p:sldIdLst>
     <p:sldId id="256" r:id="rId2"/>
@@ -19,7 +19,9 @@
     <p:sldId id="266" r:id="rId13"/>
     <p:sldId id="261" r:id="rId14"/>
     <p:sldId id="267" r:id="rId15"/>
-    <p:sldId id="270" r:id="rId16"/>
+    <p:sldId id="271" r:id="rId16"/>
+    <p:sldId id="272" r:id="rId17"/>
+    <p:sldId id="270" r:id="rId18"/>
   </p:sldIdLst>
   <p:sldSz cx="12192000" cy="6858000"/>
   <p:notesSz cx="6858000" cy="9144000"/>
@@ -27,7 +29,7 @@
     <a:defPPr>
       <a:defRPr lang="en-US"/>
     </a:defPPr>
-    <a:lvl1pPr marL="0" algn="l" defTabSz="914400" rtl="0" eaLnBrk="1" latinLnBrk="0" hangingPunct="1">
+    <a:lvl1pPr marL="0" algn="l" defTabSz="457200" rtl="0" eaLnBrk="1" latinLnBrk="0" hangingPunct="1">
       <a:defRPr sz="1800" kern="1200">
         <a:solidFill>
           <a:schemeClr val="tx1"/>
@@ -37,7 +39,7 @@
         <a:cs typeface="+mn-cs"/>
       </a:defRPr>
     </a:lvl1pPr>
-    <a:lvl2pPr marL="457200" algn="l" defTabSz="914400" rtl="0" eaLnBrk="1" latinLnBrk="0" hangingPunct="1">
+    <a:lvl2pPr marL="457200" algn="l" defTabSz="457200" rtl="0" eaLnBrk="1" latinLnBrk="0" hangingPunct="1">
       <a:defRPr sz="1800" kern="1200">
         <a:solidFill>
           <a:schemeClr val="tx1"/>
@@ -47,7 +49,7 @@
         <a:cs typeface="+mn-cs"/>
       </a:defRPr>
     </a:lvl2pPr>
-    <a:lvl3pPr marL="914400" algn="l" defTabSz="914400" rtl="0" eaLnBrk="1" latinLnBrk="0" hangingPunct="1">
+    <a:lvl3pPr marL="914400" algn="l" defTabSz="457200" rtl="0" eaLnBrk="1" latinLnBrk="0" hangingPunct="1">
       <a:defRPr sz="1800" kern="1200">
         <a:solidFill>
           <a:schemeClr val="tx1"/>
@@ -57,7 +59,7 @@
         <a:cs typeface="+mn-cs"/>
       </a:defRPr>
     </a:lvl3pPr>
-    <a:lvl4pPr marL="1371600" algn="l" defTabSz="914400" rtl="0" eaLnBrk="1" latinLnBrk="0" hangingPunct="1">
+    <a:lvl4pPr marL="1371600" algn="l" defTabSz="457200" rtl="0" eaLnBrk="1" latinLnBrk="0" hangingPunct="1">
       <a:defRPr sz="1800" kern="1200">
         <a:solidFill>
           <a:schemeClr val="tx1"/>
@@ -67,7 +69,7 @@
         <a:cs typeface="+mn-cs"/>
       </a:defRPr>
     </a:lvl4pPr>
-    <a:lvl5pPr marL="1828800" algn="l" defTabSz="914400" rtl="0" eaLnBrk="1" latinLnBrk="0" hangingPunct="1">
+    <a:lvl5pPr marL="1828800" algn="l" defTabSz="457200" rtl="0" eaLnBrk="1" latinLnBrk="0" hangingPunct="1">
       <a:defRPr sz="1800" kern="1200">
         <a:solidFill>
           <a:schemeClr val="tx1"/>
@@ -77,7 +79,7 @@
         <a:cs typeface="+mn-cs"/>
       </a:defRPr>
     </a:lvl5pPr>
-    <a:lvl6pPr marL="2286000" algn="l" defTabSz="914400" rtl="0" eaLnBrk="1" latinLnBrk="0" hangingPunct="1">
+    <a:lvl6pPr marL="2286000" algn="l" defTabSz="457200" rtl="0" eaLnBrk="1" latinLnBrk="0" hangingPunct="1">
       <a:defRPr sz="1800" kern="1200">
         <a:solidFill>
           <a:schemeClr val="tx1"/>
@@ -87,7 +89,7 @@
         <a:cs typeface="+mn-cs"/>
       </a:defRPr>
     </a:lvl6pPr>
-    <a:lvl7pPr marL="2743200" algn="l" defTabSz="914400" rtl="0" eaLnBrk="1" latinLnBrk="0" hangingPunct="1">
+    <a:lvl7pPr marL="2743200" algn="l" defTabSz="457200" rtl="0" eaLnBrk="1" latinLnBrk="0" hangingPunct="1">
       <a:defRPr sz="1800" kern="1200">
         <a:solidFill>
           <a:schemeClr val="tx1"/>
@@ -97,7 +99,7 @@
         <a:cs typeface="+mn-cs"/>
       </a:defRPr>
     </a:lvl7pPr>
-    <a:lvl8pPr marL="3200400" algn="l" defTabSz="914400" rtl="0" eaLnBrk="1" latinLnBrk="0" hangingPunct="1">
+    <a:lvl8pPr marL="3200400" algn="l" defTabSz="457200" rtl="0" eaLnBrk="1" latinLnBrk="0" hangingPunct="1">
       <a:defRPr sz="1800" kern="1200">
         <a:solidFill>
           <a:schemeClr val="tx1"/>
@@ -107,7 +109,7 @@
         <a:cs typeface="+mn-cs"/>
       </a:defRPr>
     </a:lvl8pPr>
-    <a:lvl9pPr marL="3657600" algn="l" defTabSz="914400" rtl="0" eaLnBrk="1" latinLnBrk="0" hangingPunct="1">
+    <a:lvl9pPr marL="3657600" algn="l" defTabSz="457200" rtl="0" eaLnBrk="1" latinLnBrk="0" hangingPunct="1">
       <a:defRPr sz="1800" kern="1200">
         <a:solidFill>
           <a:schemeClr val="tx1"/>
@@ -168,9 +170,10 @@
           </a:lstStyle>
           <a:p>
             <a:r>
-              <a:rPr lang="en-US"/>
+              <a:rPr lang="en-US" smtClean="0"/>
               <a:t>Click to edit Master title style</a:t>
             </a:r>
+            <a:endParaRPr lang="en-US" dirty="0"/>
           </a:p>
         </p:txBody>
       </p:sp>
@@ -232,9 +235,10 @@
           </a:lstStyle>
           <a:p>
             <a:r>
-              <a:rPr lang="en-US"/>
+              <a:rPr lang="en-US" smtClean="0"/>
               <a:t>Click to edit Master subtitle style</a:t>
             </a:r>
+            <a:endParaRPr lang="en-US" dirty="0"/>
           </a:p>
         </p:txBody>
       </p:sp>
@@ -255,7 +259,7 @@
           <a:p>
             <a:fld id="{53DC798D-381E-ED4A-8F36-6CFFBD026857}" type="datetimeFigureOut">
               <a:rPr lang="en-US" smtClean="0"/>
-              <a:t>11/29/2018</a:t>
+              <a:t>12/3/2018</a:t>
             </a:fld>
             <a:endParaRPr lang="en-US"/>
           </a:p>
@@ -306,7 +310,7 @@
     </p:spTree>
     <p:extLst>
       <p:ext uri="{BB962C8B-B14F-4D97-AF65-F5344CB8AC3E}">
-        <p14:creationId xmlns:p14="http://schemas.microsoft.com/office/powerpoint/2010/main" val="804444383"/>
+        <p14:creationId xmlns:p14="http://schemas.microsoft.com/office/powerpoint/2010/main" val="2791261684"/>
       </p:ext>
     </p:extLst>
   </p:cSld>
@@ -349,9 +353,10 @@
           <a:lstStyle/>
           <a:p>
             <a:r>
-              <a:rPr lang="en-US"/>
+              <a:rPr lang="en-US" smtClean="0"/>
               <a:t>Click to edit Master title style</a:t>
             </a:r>
+            <a:endParaRPr lang="en-US" dirty="0"/>
           </a:p>
         </p:txBody>
       </p:sp>
@@ -372,37 +377,38 @@
           <a:p>
             <a:pPr lvl="0"/>
             <a:r>
-              <a:rPr lang="en-US"/>
-              <a:t>Click to edit Master text styles</a:t>
+              <a:rPr lang="en-US" smtClean="0"/>
+              <a:t>Edit Master text styles</a:t>
             </a:r>
           </a:p>
           <a:p>
             <a:pPr lvl="1"/>
             <a:r>
-              <a:rPr lang="en-US"/>
+              <a:rPr lang="en-US" smtClean="0"/>
               <a:t>Second level</a:t>
             </a:r>
           </a:p>
           <a:p>
             <a:pPr lvl="2"/>
             <a:r>
-              <a:rPr lang="en-US"/>
+              <a:rPr lang="en-US" smtClean="0"/>
               <a:t>Third level</a:t>
             </a:r>
           </a:p>
           <a:p>
             <a:pPr lvl="3"/>
             <a:r>
-              <a:rPr lang="en-US"/>
+              <a:rPr lang="en-US" smtClean="0"/>
               <a:t>Fourth level</a:t>
             </a:r>
           </a:p>
           <a:p>
             <a:pPr lvl="4"/>
             <a:r>
-              <a:rPr lang="en-US"/>
+              <a:rPr lang="en-US" smtClean="0"/>
               <a:t>Fifth level</a:t>
             </a:r>
+            <a:endParaRPr lang="en-US" dirty="0"/>
           </a:p>
         </p:txBody>
       </p:sp>
@@ -423,7 +429,7 @@
           <a:p>
             <a:fld id="{53DC798D-381E-ED4A-8F36-6CFFBD026857}" type="datetimeFigureOut">
               <a:rPr lang="en-US" smtClean="0"/>
-              <a:t>11/29/2018</a:t>
+              <a:t>12/3/2018</a:t>
             </a:fld>
             <a:endParaRPr lang="en-US"/>
           </a:p>
@@ -474,7 +480,7 @@
     </p:spTree>
     <p:extLst>
       <p:ext uri="{BB962C8B-B14F-4D97-AF65-F5344CB8AC3E}">
-        <p14:creationId xmlns:p14="http://schemas.microsoft.com/office/powerpoint/2010/main" val="426632567"/>
+        <p14:creationId xmlns:p14="http://schemas.microsoft.com/office/powerpoint/2010/main" val="2992001855"/>
       </p:ext>
     </p:extLst>
   </p:cSld>
@@ -522,9 +528,10 @@
           <a:lstStyle/>
           <a:p>
             <a:r>
-              <a:rPr lang="en-US"/>
+              <a:rPr lang="en-US" smtClean="0"/>
               <a:t>Click to edit Master title style</a:t>
             </a:r>
+            <a:endParaRPr lang="en-US" dirty="0"/>
           </a:p>
         </p:txBody>
       </p:sp>
@@ -550,37 +557,38 @@
           <a:p>
             <a:pPr lvl="0"/>
             <a:r>
-              <a:rPr lang="en-US"/>
-              <a:t>Click to edit Master text styles</a:t>
+              <a:rPr lang="en-US" smtClean="0"/>
+              <a:t>Edit Master text styles</a:t>
             </a:r>
           </a:p>
           <a:p>
             <a:pPr lvl="1"/>
             <a:r>
-              <a:rPr lang="en-US"/>
+              <a:rPr lang="en-US" smtClean="0"/>
               <a:t>Second level</a:t>
             </a:r>
           </a:p>
           <a:p>
             <a:pPr lvl="2"/>
             <a:r>
-              <a:rPr lang="en-US"/>
+              <a:rPr lang="en-US" smtClean="0"/>
               <a:t>Third level</a:t>
             </a:r>
           </a:p>
           <a:p>
             <a:pPr lvl="3"/>
             <a:r>
-              <a:rPr lang="en-US"/>
+              <a:rPr lang="en-US" smtClean="0"/>
               <a:t>Fourth level</a:t>
             </a:r>
           </a:p>
           <a:p>
             <a:pPr lvl="4"/>
             <a:r>
-              <a:rPr lang="en-US"/>
+              <a:rPr lang="en-US" smtClean="0"/>
               <a:t>Fifth level</a:t>
             </a:r>
+            <a:endParaRPr lang="en-US" dirty="0"/>
           </a:p>
         </p:txBody>
       </p:sp>
@@ -601,7 +609,7 @@
           <a:p>
             <a:fld id="{53DC798D-381E-ED4A-8F36-6CFFBD026857}" type="datetimeFigureOut">
               <a:rPr lang="en-US" smtClean="0"/>
-              <a:t>11/29/2018</a:t>
+              <a:t>12/3/2018</a:t>
             </a:fld>
             <a:endParaRPr lang="en-US"/>
           </a:p>
@@ -652,7 +660,7 @@
     </p:spTree>
     <p:extLst>
       <p:ext uri="{BB962C8B-B14F-4D97-AF65-F5344CB8AC3E}">
-        <p14:creationId xmlns:p14="http://schemas.microsoft.com/office/powerpoint/2010/main" val="2113139883"/>
+        <p14:creationId xmlns:p14="http://schemas.microsoft.com/office/powerpoint/2010/main" val="3020463756"/>
       </p:ext>
     </p:extLst>
   </p:cSld>
@@ -695,9 +703,10 @@
           <a:lstStyle/>
           <a:p>
             <a:r>
-              <a:rPr lang="en-US"/>
+              <a:rPr lang="en-US" smtClean="0"/>
               <a:t>Click to edit Master title style</a:t>
             </a:r>
+            <a:endParaRPr lang="en-US" dirty="0"/>
           </a:p>
         </p:txBody>
       </p:sp>
@@ -718,37 +727,38 @@
           <a:p>
             <a:pPr lvl="0"/>
             <a:r>
-              <a:rPr lang="en-US"/>
-              <a:t>Click to edit Master text styles</a:t>
+              <a:rPr lang="en-US" smtClean="0"/>
+              <a:t>Edit Master text styles</a:t>
             </a:r>
           </a:p>
           <a:p>
             <a:pPr lvl="1"/>
             <a:r>
-              <a:rPr lang="en-US"/>
+              <a:rPr lang="en-US" smtClean="0"/>
               <a:t>Second level</a:t>
             </a:r>
           </a:p>
           <a:p>
             <a:pPr lvl="2"/>
             <a:r>
-              <a:rPr lang="en-US"/>
+              <a:rPr lang="en-US" smtClean="0"/>
               <a:t>Third level</a:t>
             </a:r>
           </a:p>
           <a:p>
             <a:pPr lvl="3"/>
             <a:r>
-              <a:rPr lang="en-US"/>
+              <a:rPr lang="en-US" smtClean="0"/>
               <a:t>Fourth level</a:t>
             </a:r>
           </a:p>
           <a:p>
             <a:pPr lvl="4"/>
             <a:r>
-              <a:rPr lang="en-US"/>
+              <a:rPr lang="en-US" smtClean="0"/>
               <a:t>Fifth level</a:t>
             </a:r>
+            <a:endParaRPr lang="en-US" dirty="0"/>
           </a:p>
         </p:txBody>
       </p:sp>
@@ -769,7 +779,7 @@
           <a:p>
             <a:fld id="{53DC798D-381E-ED4A-8F36-6CFFBD026857}" type="datetimeFigureOut">
               <a:rPr lang="en-US" smtClean="0"/>
-              <a:t>11/29/2018</a:t>
+              <a:t>12/3/2018</a:t>
             </a:fld>
             <a:endParaRPr lang="en-US"/>
           </a:p>
@@ -820,7 +830,7 @@
     </p:spTree>
     <p:extLst>
       <p:ext uri="{BB962C8B-B14F-4D97-AF65-F5344CB8AC3E}">
-        <p14:creationId xmlns:p14="http://schemas.microsoft.com/office/powerpoint/2010/main" val="37718957"/>
+        <p14:creationId xmlns:p14="http://schemas.microsoft.com/office/powerpoint/2010/main" val="3122247044"/>
       </p:ext>
     </p:extLst>
   </p:cSld>
@@ -872,9 +882,10 @@
           </a:lstStyle>
           <a:p>
             <a:r>
-              <a:rPr lang="en-US"/>
+              <a:rPr lang="en-US" smtClean="0"/>
               <a:t>Click to edit Master title style</a:t>
             </a:r>
+            <a:endParaRPr lang="en-US" dirty="0"/>
           </a:p>
         </p:txBody>
       </p:sp>
@@ -991,8 +1002,8 @@
           <a:p>
             <a:pPr lvl="0"/>
             <a:r>
-              <a:rPr lang="en-US"/>
-              <a:t>Click to edit Master text styles</a:t>
+              <a:rPr lang="en-US" smtClean="0"/>
+              <a:t>Edit Master text styles</a:t>
             </a:r>
           </a:p>
         </p:txBody>
@@ -1014,7 +1025,7 @@
           <a:p>
             <a:fld id="{53DC798D-381E-ED4A-8F36-6CFFBD026857}" type="datetimeFigureOut">
               <a:rPr lang="en-US" smtClean="0"/>
-              <a:t>11/29/2018</a:t>
+              <a:t>12/3/2018</a:t>
             </a:fld>
             <a:endParaRPr lang="en-US"/>
           </a:p>
@@ -1065,7 +1076,7 @@
     </p:spTree>
     <p:extLst>
       <p:ext uri="{BB962C8B-B14F-4D97-AF65-F5344CB8AC3E}">
-        <p14:creationId xmlns:p14="http://schemas.microsoft.com/office/powerpoint/2010/main" val="622145222"/>
+        <p14:creationId xmlns:p14="http://schemas.microsoft.com/office/powerpoint/2010/main" val="610542002"/>
       </p:ext>
     </p:extLst>
   </p:cSld>
@@ -1108,9 +1119,10 @@
           <a:lstStyle/>
           <a:p>
             <a:r>
-              <a:rPr lang="en-US"/>
+              <a:rPr lang="en-US" smtClean="0"/>
               <a:t>Click to edit Master title style</a:t>
             </a:r>
+            <a:endParaRPr lang="en-US" dirty="0"/>
           </a:p>
         </p:txBody>
       </p:sp>
@@ -1136,37 +1148,38 @@
           <a:p>
             <a:pPr lvl="0"/>
             <a:r>
-              <a:rPr lang="en-US"/>
-              <a:t>Click to edit Master text styles</a:t>
+              <a:rPr lang="en-US" smtClean="0"/>
+              <a:t>Edit Master text styles</a:t>
             </a:r>
           </a:p>
           <a:p>
             <a:pPr lvl="1"/>
             <a:r>
-              <a:rPr lang="en-US"/>
+              <a:rPr lang="en-US" smtClean="0"/>
               <a:t>Second level</a:t>
             </a:r>
           </a:p>
           <a:p>
             <a:pPr lvl="2"/>
             <a:r>
-              <a:rPr lang="en-US"/>
+              <a:rPr lang="en-US" smtClean="0"/>
               <a:t>Third level</a:t>
             </a:r>
           </a:p>
           <a:p>
             <a:pPr lvl="3"/>
             <a:r>
-              <a:rPr lang="en-US"/>
+              <a:rPr lang="en-US" smtClean="0"/>
               <a:t>Fourth level</a:t>
             </a:r>
           </a:p>
           <a:p>
             <a:pPr lvl="4"/>
             <a:r>
-              <a:rPr lang="en-US"/>
+              <a:rPr lang="en-US" smtClean="0"/>
               <a:t>Fifth level</a:t>
             </a:r>
+            <a:endParaRPr lang="en-US" dirty="0"/>
           </a:p>
         </p:txBody>
       </p:sp>
@@ -1192,37 +1205,38 @@
           <a:p>
             <a:pPr lvl="0"/>
             <a:r>
-              <a:rPr lang="en-US"/>
-              <a:t>Click to edit Master text styles</a:t>
+              <a:rPr lang="en-US" smtClean="0"/>
+              <a:t>Edit Master text styles</a:t>
             </a:r>
           </a:p>
           <a:p>
             <a:pPr lvl="1"/>
             <a:r>
-              <a:rPr lang="en-US"/>
+              <a:rPr lang="en-US" smtClean="0"/>
               <a:t>Second level</a:t>
             </a:r>
           </a:p>
           <a:p>
             <a:pPr lvl="2"/>
             <a:r>
-              <a:rPr lang="en-US"/>
+              <a:rPr lang="en-US" smtClean="0"/>
               <a:t>Third level</a:t>
             </a:r>
           </a:p>
           <a:p>
             <a:pPr lvl="3"/>
             <a:r>
-              <a:rPr lang="en-US"/>
+              <a:rPr lang="en-US" smtClean="0"/>
               <a:t>Fourth level</a:t>
             </a:r>
           </a:p>
           <a:p>
             <a:pPr lvl="4"/>
             <a:r>
-              <a:rPr lang="en-US"/>
+              <a:rPr lang="en-US" smtClean="0"/>
               <a:t>Fifth level</a:t>
             </a:r>
+            <a:endParaRPr lang="en-US" dirty="0"/>
           </a:p>
         </p:txBody>
       </p:sp>
@@ -1243,7 +1257,7 @@
           <a:p>
             <a:fld id="{53DC798D-381E-ED4A-8F36-6CFFBD026857}" type="datetimeFigureOut">
               <a:rPr lang="en-US" smtClean="0"/>
-              <a:t>11/29/2018</a:t>
+              <a:t>12/3/2018</a:t>
             </a:fld>
             <a:endParaRPr lang="en-US"/>
           </a:p>
@@ -1294,7 +1308,7 @@
     </p:spTree>
     <p:extLst>
       <p:ext uri="{BB962C8B-B14F-4D97-AF65-F5344CB8AC3E}">
-        <p14:creationId xmlns:p14="http://schemas.microsoft.com/office/powerpoint/2010/main" val="296868911"/>
+        <p14:creationId xmlns:p14="http://schemas.microsoft.com/office/powerpoint/2010/main" val="157890569"/>
       </p:ext>
     </p:extLst>
   </p:cSld>
@@ -1342,9 +1356,10 @@
           <a:lstStyle/>
           <a:p>
             <a:r>
-              <a:rPr lang="en-US"/>
+              <a:rPr lang="en-US" smtClean="0"/>
               <a:t>Click to edit Master title style</a:t>
             </a:r>
+            <a:endParaRPr lang="en-US" dirty="0"/>
           </a:p>
         </p:txBody>
       </p:sp>
@@ -1407,8 +1422,8 @@
           <a:p>
             <a:pPr lvl="0"/>
             <a:r>
-              <a:rPr lang="en-US"/>
-              <a:t>Click to edit Master text styles</a:t>
+              <a:rPr lang="en-US" smtClean="0"/>
+              <a:t>Edit Master text styles</a:t>
             </a:r>
           </a:p>
         </p:txBody>
@@ -1435,37 +1450,38 @@
           <a:p>
             <a:pPr lvl="0"/>
             <a:r>
-              <a:rPr lang="en-US"/>
-              <a:t>Click to edit Master text styles</a:t>
+              <a:rPr lang="en-US" smtClean="0"/>
+              <a:t>Edit Master text styles</a:t>
             </a:r>
           </a:p>
           <a:p>
             <a:pPr lvl="1"/>
             <a:r>
-              <a:rPr lang="en-US"/>
+              <a:rPr lang="en-US" smtClean="0"/>
               <a:t>Second level</a:t>
             </a:r>
           </a:p>
           <a:p>
             <a:pPr lvl="2"/>
             <a:r>
-              <a:rPr lang="en-US"/>
+              <a:rPr lang="en-US" smtClean="0"/>
               <a:t>Third level</a:t>
             </a:r>
           </a:p>
           <a:p>
             <a:pPr lvl="3"/>
             <a:r>
-              <a:rPr lang="en-US"/>
+              <a:rPr lang="en-US" smtClean="0"/>
               <a:t>Fourth level</a:t>
             </a:r>
           </a:p>
           <a:p>
             <a:pPr lvl="4"/>
             <a:r>
-              <a:rPr lang="en-US"/>
+              <a:rPr lang="en-US" smtClean="0"/>
               <a:t>Fifth level</a:t>
             </a:r>
+            <a:endParaRPr lang="en-US" dirty="0"/>
           </a:p>
         </p:txBody>
       </p:sp>
@@ -1528,8 +1544,8 @@
           <a:p>
             <a:pPr lvl="0"/>
             <a:r>
-              <a:rPr lang="en-US"/>
-              <a:t>Click to edit Master text styles</a:t>
+              <a:rPr lang="en-US" smtClean="0"/>
+              <a:t>Edit Master text styles</a:t>
             </a:r>
           </a:p>
         </p:txBody>
@@ -1556,37 +1572,38 @@
           <a:p>
             <a:pPr lvl="0"/>
             <a:r>
-              <a:rPr lang="en-US"/>
-              <a:t>Click to edit Master text styles</a:t>
+              <a:rPr lang="en-US" smtClean="0"/>
+              <a:t>Edit Master text styles</a:t>
             </a:r>
           </a:p>
           <a:p>
             <a:pPr lvl="1"/>
             <a:r>
-              <a:rPr lang="en-US"/>
+              <a:rPr lang="en-US" smtClean="0"/>
               <a:t>Second level</a:t>
             </a:r>
           </a:p>
           <a:p>
             <a:pPr lvl="2"/>
             <a:r>
-              <a:rPr lang="en-US"/>
+              <a:rPr lang="en-US" smtClean="0"/>
               <a:t>Third level</a:t>
             </a:r>
           </a:p>
           <a:p>
             <a:pPr lvl="3"/>
             <a:r>
-              <a:rPr lang="en-US"/>
+              <a:rPr lang="en-US" smtClean="0"/>
               <a:t>Fourth level</a:t>
             </a:r>
           </a:p>
           <a:p>
             <a:pPr lvl="4"/>
             <a:r>
-              <a:rPr lang="en-US"/>
+              <a:rPr lang="en-US" smtClean="0"/>
               <a:t>Fifth level</a:t>
             </a:r>
+            <a:endParaRPr lang="en-US" dirty="0"/>
           </a:p>
         </p:txBody>
       </p:sp>
@@ -1607,7 +1624,7 @@
           <a:p>
             <a:fld id="{53DC798D-381E-ED4A-8F36-6CFFBD026857}" type="datetimeFigureOut">
               <a:rPr lang="en-US" smtClean="0"/>
-              <a:t>11/29/2018</a:t>
+              <a:t>12/3/2018</a:t>
             </a:fld>
             <a:endParaRPr lang="en-US"/>
           </a:p>
@@ -1658,7 +1675,7 @@
     </p:spTree>
     <p:extLst>
       <p:ext uri="{BB962C8B-B14F-4D97-AF65-F5344CB8AC3E}">
-        <p14:creationId xmlns:p14="http://schemas.microsoft.com/office/powerpoint/2010/main" val="871275196"/>
+        <p14:creationId xmlns:p14="http://schemas.microsoft.com/office/powerpoint/2010/main" val="3577969472"/>
       </p:ext>
     </p:extLst>
   </p:cSld>
@@ -1701,9 +1718,10 @@
           <a:lstStyle/>
           <a:p>
             <a:r>
-              <a:rPr lang="en-US"/>
+              <a:rPr lang="en-US" smtClean="0"/>
               <a:t>Click to edit Master title style</a:t>
             </a:r>
+            <a:endParaRPr lang="en-US" dirty="0"/>
           </a:p>
         </p:txBody>
       </p:sp>
@@ -1724,7 +1742,7 @@
           <a:p>
             <a:fld id="{53DC798D-381E-ED4A-8F36-6CFFBD026857}" type="datetimeFigureOut">
               <a:rPr lang="en-US" smtClean="0"/>
-              <a:t>11/29/2018</a:t>
+              <a:t>12/3/2018</a:t>
             </a:fld>
             <a:endParaRPr lang="en-US"/>
           </a:p>
@@ -1775,7 +1793,7 @@
     </p:spTree>
     <p:extLst>
       <p:ext uri="{BB962C8B-B14F-4D97-AF65-F5344CB8AC3E}">
-        <p14:creationId xmlns:p14="http://schemas.microsoft.com/office/powerpoint/2010/main" val="1978713926"/>
+        <p14:creationId xmlns:p14="http://schemas.microsoft.com/office/powerpoint/2010/main" val="1808012811"/>
       </p:ext>
     </p:extLst>
   </p:cSld>
@@ -1819,7 +1837,7 @@
           <a:p>
             <a:fld id="{53DC798D-381E-ED4A-8F36-6CFFBD026857}" type="datetimeFigureOut">
               <a:rPr lang="en-US" smtClean="0"/>
-              <a:t>11/29/2018</a:t>
+              <a:t>12/3/2018</a:t>
             </a:fld>
             <a:endParaRPr lang="en-US"/>
           </a:p>
@@ -1870,7 +1888,7 @@
     </p:spTree>
     <p:extLst>
       <p:ext uri="{BB962C8B-B14F-4D97-AF65-F5344CB8AC3E}">
-        <p14:creationId xmlns:p14="http://schemas.microsoft.com/office/powerpoint/2010/main" val="313196840"/>
+        <p14:creationId xmlns:p14="http://schemas.microsoft.com/office/powerpoint/2010/main" val="4140351627"/>
       </p:ext>
     </p:extLst>
   </p:cSld>
@@ -1922,9 +1940,10 @@
           </a:lstStyle>
           <a:p>
             <a:r>
-              <a:rPr lang="en-US"/>
+              <a:rPr lang="en-US" smtClean="0"/>
               <a:t>Click to edit Master title style</a:t>
             </a:r>
+            <a:endParaRPr lang="en-US" dirty="0"/>
           </a:p>
         </p:txBody>
       </p:sp>
@@ -1978,37 +1997,38 @@
           <a:p>
             <a:pPr lvl="0"/>
             <a:r>
-              <a:rPr lang="en-US"/>
-              <a:t>Click to edit Master text styles</a:t>
+              <a:rPr lang="en-US" smtClean="0"/>
+              <a:t>Edit Master text styles</a:t>
             </a:r>
           </a:p>
           <a:p>
             <a:pPr lvl="1"/>
             <a:r>
-              <a:rPr lang="en-US"/>
+              <a:rPr lang="en-US" smtClean="0"/>
               <a:t>Second level</a:t>
             </a:r>
           </a:p>
           <a:p>
             <a:pPr lvl="2"/>
             <a:r>
-              <a:rPr lang="en-US"/>
+              <a:rPr lang="en-US" smtClean="0"/>
               <a:t>Third level</a:t>
             </a:r>
           </a:p>
           <a:p>
             <a:pPr lvl="3"/>
             <a:r>
-              <a:rPr lang="en-US"/>
+              <a:rPr lang="en-US" smtClean="0"/>
               <a:t>Fourth level</a:t>
             </a:r>
           </a:p>
           <a:p>
             <a:pPr lvl="4"/>
             <a:r>
-              <a:rPr lang="en-US"/>
+              <a:rPr lang="en-US" smtClean="0"/>
               <a:t>Fifth level</a:t>
             </a:r>
+            <a:endParaRPr lang="en-US" dirty="0"/>
           </a:p>
         </p:txBody>
       </p:sp>
@@ -2071,8 +2091,8 @@
           <a:p>
             <a:pPr lvl="0"/>
             <a:r>
-              <a:rPr lang="en-US"/>
-              <a:t>Click to edit Master text styles</a:t>
+              <a:rPr lang="en-US" smtClean="0"/>
+              <a:t>Edit Master text styles</a:t>
             </a:r>
           </a:p>
         </p:txBody>
@@ -2094,7 +2114,7 @@
           <a:p>
             <a:fld id="{53DC798D-381E-ED4A-8F36-6CFFBD026857}" type="datetimeFigureOut">
               <a:rPr lang="en-US" smtClean="0"/>
-              <a:t>11/29/2018</a:t>
+              <a:t>12/3/2018</a:t>
             </a:fld>
             <a:endParaRPr lang="en-US"/>
           </a:p>
@@ -2145,7 +2165,7 @@
     </p:spTree>
     <p:extLst>
       <p:ext uri="{BB962C8B-B14F-4D97-AF65-F5344CB8AC3E}">
-        <p14:creationId xmlns:p14="http://schemas.microsoft.com/office/powerpoint/2010/main" val="416871083"/>
+        <p14:creationId xmlns:p14="http://schemas.microsoft.com/office/powerpoint/2010/main" val="3741290604"/>
       </p:ext>
     </p:extLst>
   </p:cSld>
@@ -2197,9 +2217,10 @@
           </a:lstStyle>
           <a:p>
             <a:r>
-              <a:rPr lang="en-US"/>
+              <a:rPr lang="en-US" smtClean="0"/>
               <a:t>Click to edit Master title style</a:t>
             </a:r>
+            <a:endParaRPr lang="en-US" dirty="0"/>
           </a:p>
         </p:txBody>
       </p:sp>
@@ -2207,7 +2228,7 @@
         <p:nvSpPr>
           <p:cNvPr id="3" name="Picture Placeholder 2"/>
           <p:cNvSpPr>
-            <a:spLocks noGrp="1"/>
+            <a:spLocks noGrp="1" noChangeAspect="1"/>
           </p:cNvSpPr>
           <p:nvPr>
             <p:ph type="pic" idx="1"/>
@@ -2220,7 +2241,7 @@
           </a:xfrm>
         </p:spPr>
         <p:txBody>
-          <a:bodyPr/>
+          <a:bodyPr anchor="t"/>
           <a:lstStyle>
             <a:lvl1pPr marL="0" indent="0">
               <a:buNone/>
@@ -2260,7 +2281,11 @@
             </a:lvl9pPr>
           </a:lstStyle>
           <a:p>
-            <a:endParaRPr lang="en-US"/>
+            <a:r>
+              <a:rPr lang="en-US" smtClean="0"/>
+              <a:t>Click icon to add picture</a:t>
+            </a:r>
+            <a:endParaRPr lang="en-US" dirty="0"/>
           </a:p>
         </p:txBody>
       </p:sp>
@@ -2323,8 +2348,8 @@
           <a:p>
             <a:pPr lvl="0"/>
             <a:r>
-              <a:rPr lang="en-US"/>
-              <a:t>Click to edit Master text styles</a:t>
+              <a:rPr lang="en-US" smtClean="0"/>
+              <a:t>Edit Master text styles</a:t>
             </a:r>
           </a:p>
         </p:txBody>
@@ -2346,7 +2371,7 @@
           <a:p>
             <a:fld id="{53DC798D-381E-ED4A-8F36-6CFFBD026857}" type="datetimeFigureOut">
               <a:rPr lang="en-US" smtClean="0"/>
-              <a:t>11/29/2018</a:t>
+              <a:t>12/3/2018</a:t>
             </a:fld>
             <a:endParaRPr lang="en-US"/>
           </a:p>
@@ -2397,7 +2422,7 @@
     </p:spTree>
     <p:extLst>
       <p:ext uri="{BB962C8B-B14F-4D97-AF65-F5344CB8AC3E}">
-        <p14:creationId xmlns:p14="http://schemas.microsoft.com/office/powerpoint/2010/main" val="1260635467"/>
+        <p14:creationId xmlns:p14="http://schemas.microsoft.com/office/powerpoint/2010/main" val="1391732715"/>
       </p:ext>
     </p:extLst>
   </p:cSld>
@@ -2455,9 +2480,10 @@
           <a:lstStyle/>
           <a:p>
             <a:r>
-              <a:rPr lang="en-US"/>
+              <a:rPr lang="en-US" smtClean="0"/>
               <a:t>Click to edit Master title style</a:t>
             </a:r>
+            <a:endParaRPr lang="en-US" dirty="0"/>
           </a:p>
         </p:txBody>
       </p:sp>
@@ -2488,37 +2514,38 @@
           <a:p>
             <a:pPr lvl="0"/>
             <a:r>
-              <a:rPr lang="en-US"/>
-              <a:t>Click to edit Master text styles</a:t>
+              <a:rPr lang="en-US" smtClean="0"/>
+              <a:t>Edit Master text styles</a:t>
             </a:r>
           </a:p>
           <a:p>
             <a:pPr lvl="1"/>
             <a:r>
-              <a:rPr lang="en-US"/>
+              <a:rPr lang="en-US" smtClean="0"/>
               <a:t>Second level</a:t>
             </a:r>
           </a:p>
           <a:p>
             <a:pPr lvl="2"/>
             <a:r>
-              <a:rPr lang="en-US"/>
+              <a:rPr lang="en-US" smtClean="0"/>
               <a:t>Third level</a:t>
             </a:r>
           </a:p>
           <a:p>
             <a:pPr lvl="3"/>
             <a:r>
-              <a:rPr lang="en-US"/>
+              <a:rPr lang="en-US" smtClean="0"/>
               <a:t>Fourth level</a:t>
             </a:r>
           </a:p>
           <a:p>
             <a:pPr lvl="4"/>
             <a:r>
-              <a:rPr lang="en-US"/>
+              <a:rPr lang="en-US" smtClean="0"/>
               <a:t>Fifth level</a:t>
             </a:r>
+            <a:endParaRPr lang="en-US" dirty="0"/>
           </a:p>
         </p:txBody>
       </p:sp>
@@ -2557,7 +2584,7 @@
           <a:p>
             <a:fld id="{53DC798D-381E-ED4A-8F36-6CFFBD026857}" type="datetimeFigureOut">
               <a:rPr lang="en-US" smtClean="0"/>
-              <a:t>11/29/2018</a:t>
+              <a:t>12/3/2018</a:t>
             </a:fld>
             <a:endParaRPr lang="en-US"/>
           </a:p>
@@ -2644,23 +2671,23 @@
     </p:spTree>
     <p:extLst>
       <p:ext uri="{BB962C8B-B14F-4D97-AF65-F5344CB8AC3E}">
-        <p14:creationId xmlns:p14="http://schemas.microsoft.com/office/powerpoint/2010/main" val="1049065579"/>
+        <p14:creationId xmlns:p14="http://schemas.microsoft.com/office/powerpoint/2010/main" val="425629224"/>
       </p:ext>
     </p:extLst>
   </p:cSld>
-  <p:clrMap bg1="lt1" tx1="dk1" bg2="lt2" tx2="dk2" accent1="accent1" accent2="accent2" accent3="accent3" accent4="accent4" accent5="accent5" accent6="accent6" hlink="hlink" folHlink="folHlink"/>
+  <p:clrMap bg1="dk1" tx1="lt1" bg2="dk2" tx2="lt2" accent1="accent1" accent2="accent2" accent3="accent3" accent4="accent4" accent5="accent5" accent6="accent6" hlink="hlink" folHlink="folHlink"/>
   <p:sldLayoutIdLst>
-    <p:sldLayoutId id="2147483649" r:id="rId1"/>
-    <p:sldLayoutId id="2147483650" r:id="rId2"/>
-    <p:sldLayoutId id="2147483651" r:id="rId3"/>
-    <p:sldLayoutId id="2147483652" r:id="rId4"/>
-    <p:sldLayoutId id="2147483653" r:id="rId5"/>
-    <p:sldLayoutId id="2147483654" r:id="rId6"/>
-    <p:sldLayoutId id="2147483655" r:id="rId7"/>
-    <p:sldLayoutId id="2147483656" r:id="rId8"/>
-    <p:sldLayoutId id="2147483657" r:id="rId9"/>
-    <p:sldLayoutId id="2147483658" r:id="rId10"/>
-    <p:sldLayoutId id="2147483659" r:id="rId11"/>
+    <p:sldLayoutId id="2147483661" r:id="rId1"/>
+    <p:sldLayoutId id="2147483662" r:id="rId2"/>
+    <p:sldLayoutId id="2147483663" r:id="rId3"/>
+    <p:sldLayoutId id="2147483664" r:id="rId4"/>
+    <p:sldLayoutId id="2147483665" r:id="rId5"/>
+    <p:sldLayoutId id="2147483666" r:id="rId6"/>
+    <p:sldLayoutId id="2147483667" r:id="rId7"/>
+    <p:sldLayoutId id="2147483668" r:id="rId8"/>
+    <p:sldLayoutId id="2147483669" r:id="rId9"/>
+    <p:sldLayoutId id="2147483670" r:id="rId10"/>
+    <p:sldLayoutId id="2147483671" r:id="rId11"/>
   </p:sldLayoutIdLst>
   <p:txStyles>
     <p:titleStyle>
@@ -2690,7 +2717,7 @@
         <a:spcBef>
           <a:spcPts val="1000"/>
         </a:spcBef>
-        <a:buFont typeface="Arial"/>
+        <a:buFont typeface="Arial" panose="020B0604020202020204" pitchFamily="34" charset="0"/>
         <a:buChar char="•"/>
         <a:defRPr sz="2800" kern="1200">
           <a:solidFill>
@@ -2708,7 +2735,7 @@
         <a:spcBef>
           <a:spcPts val="500"/>
         </a:spcBef>
-        <a:buFont typeface="Arial"/>
+        <a:buFont typeface="Arial" panose="020B0604020202020204" pitchFamily="34" charset="0"/>
         <a:buChar char="•"/>
         <a:defRPr sz="2400" kern="1200">
           <a:solidFill>
@@ -2726,7 +2753,7 @@
         <a:spcBef>
           <a:spcPts val="500"/>
         </a:spcBef>
-        <a:buFont typeface="Arial"/>
+        <a:buFont typeface="Arial" panose="020B0604020202020204" pitchFamily="34" charset="0"/>
         <a:buChar char="•"/>
         <a:defRPr sz="2000" kern="1200">
           <a:solidFill>
@@ -2744,7 +2771,7 @@
         <a:spcBef>
           <a:spcPts val="500"/>
         </a:spcBef>
-        <a:buFont typeface="Arial"/>
+        <a:buFont typeface="Arial" panose="020B0604020202020204" pitchFamily="34" charset="0"/>
         <a:buChar char="•"/>
         <a:defRPr sz="1800" kern="1200">
           <a:solidFill>
@@ -2762,7 +2789,7 @@
         <a:spcBef>
           <a:spcPts val="500"/>
         </a:spcBef>
-        <a:buFont typeface="Arial"/>
+        <a:buFont typeface="Arial" panose="020B0604020202020204" pitchFamily="34" charset="0"/>
         <a:buChar char="•"/>
         <a:defRPr sz="1800" kern="1200">
           <a:solidFill>
@@ -2780,7 +2807,7 @@
         <a:spcBef>
           <a:spcPts val="500"/>
         </a:spcBef>
-        <a:buFont typeface="Arial"/>
+        <a:buFont typeface="Arial" panose="020B0604020202020204" pitchFamily="34" charset="0"/>
         <a:buChar char="•"/>
         <a:defRPr sz="1800" kern="1200">
           <a:solidFill>
@@ -2798,7 +2825,7 @@
         <a:spcBef>
           <a:spcPts val="500"/>
         </a:spcBef>
-        <a:buFont typeface="Arial"/>
+        <a:buFont typeface="Arial" panose="020B0604020202020204" pitchFamily="34" charset="0"/>
         <a:buChar char="•"/>
         <a:defRPr sz="1800" kern="1200">
           <a:solidFill>
@@ -2816,7 +2843,7 @@
         <a:spcBef>
           <a:spcPts val="500"/>
         </a:spcBef>
-        <a:buFont typeface="Arial"/>
+        <a:buFont typeface="Arial" panose="020B0604020202020204" pitchFamily="34" charset="0"/>
         <a:buChar char="•"/>
         <a:defRPr sz="1800" kern="1200">
           <a:solidFill>
@@ -2834,7 +2861,7 @@
         <a:spcBef>
           <a:spcPts val="500"/>
         </a:spcBef>
-        <a:buFont typeface="Arial"/>
+        <a:buFont typeface="Arial" panose="020B0604020202020204" pitchFamily="34" charset="0"/>
         <a:buChar char="•"/>
         <a:defRPr sz="1800" kern="1200">
           <a:solidFill>
@@ -3356,16 +3383,11 @@
             <a:r>
               <a:rPr lang="en-US" dirty="0">
                 <a:solidFill>
-                  <a:srgbClr val="FF0000"/>
+                  <a:srgbClr val="FFC000"/>
                 </a:solidFill>
               </a:rPr>
               <a:t>Are longer crop rotations associated with less weed pressure?</a:t>
             </a:r>
-            <a:endParaRPr lang="en-US" dirty="0">
-              <a:solidFill>
-                <a:srgbClr val="FF0000"/>
-              </a:solidFill>
-            </a:endParaRPr>
           </a:p>
         </p:txBody>
       </p:sp>
@@ -3464,10 +3486,18 @@
           <a:lstStyle/>
           <a:p>
             <a:r>
-              <a:rPr lang="en-US" dirty="0" smtClean="0"/>
+              <a:rPr lang="en-US" dirty="0" smtClean="0">
+                <a:solidFill>
+                  <a:srgbClr val="FFC000"/>
+                </a:solidFill>
+              </a:rPr>
               <a:t>Under what circumstances?</a:t>
             </a:r>
-            <a:endParaRPr lang="en-US" dirty="0"/>
+            <a:endParaRPr lang="en-US" dirty="0">
+              <a:solidFill>
+                <a:srgbClr val="FFC000"/>
+              </a:solidFill>
+            </a:endParaRPr>
           </a:p>
         </p:txBody>
       </p:sp>
@@ -3502,23 +3532,6 @@
               <a:t>crop rotations reduce single (likely problematic) weeds more so than the entire weed community. </a:t>
             </a:r>
             <a:endParaRPr lang="en-US" dirty="0" smtClean="0"/>
-          </a:p>
-          <a:p>
-            <a:r>
-              <a:rPr lang="en-US" dirty="0"/>
-              <a:t>Weed density is particularly reduced in zero-tillage systems</a:t>
-            </a:r>
-            <a:r>
-              <a:rPr lang="en-US" dirty="0" smtClean="0"/>
-              <a:t>.</a:t>
-            </a:r>
-          </a:p>
-          <a:p>
-            <a:r>
-              <a:rPr lang="en-US" dirty="0" smtClean="0"/>
-              <a:t>Long rotations help in both herbicide- and organic-based systems. </a:t>
-            </a:r>
-            <a:endParaRPr lang="en-US" dirty="0"/>
           </a:p>
           <a:p>
             <a:endParaRPr lang="en-US" dirty="0"/>
@@ -3555,6 +3568,52 @@
           </a:prstGeom>
         </p:spPr>
       </p:pic>
+      <p:sp>
+        <p:nvSpPr>
+          <p:cNvPr id="5" name="Oval 4"/>
+          <p:cNvSpPr/>
+          <p:nvPr/>
+        </p:nvSpPr>
+        <p:spPr>
+          <a:xfrm>
+            <a:off x="6042991" y="2053011"/>
+            <a:ext cx="3474720" cy="968485"/>
+          </a:xfrm>
+          <a:prstGeom prst="ellipse">
+            <a:avLst/>
+          </a:prstGeom>
+          <a:noFill/>
+          <a:ln w="57150">
+            <a:solidFill>
+              <a:srgbClr val="FF0000"/>
+            </a:solidFill>
+          </a:ln>
+        </p:spPr>
+        <p:style>
+          <a:lnRef idx="2">
+            <a:schemeClr val="accent1">
+              <a:shade val="50000"/>
+            </a:schemeClr>
+          </a:lnRef>
+          <a:fillRef idx="1">
+            <a:schemeClr val="accent1"/>
+          </a:fillRef>
+          <a:effectRef idx="0">
+            <a:schemeClr val="accent1"/>
+          </a:effectRef>
+          <a:fontRef idx="minor">
+            <a:schemeClr val="lt1"/>
+          </a:fontRef>
+        </p:style>
+        <p:txBody>
+          <a:bodyPr rtlCol="0" anchor="ctr"/>
+          <a:lstStyle/>
+          <a:p>
+            <a:pPr algn="ctr"/>
+            <a:endParaRPr lang="en-US"/>
+          </a:p>
+        </p:txBody>
+      </p:sp>
     </p:spTree>
     <p:extLst>
       <p:ext uri="{BB962C8B-B14F-4D97-AF65-F5344CB8AC3E}">
@@ -3601,12 +3660,371 @@
           <a:lstStyle/>
           <a:p>
             <a:r>
+              <a:rPr lang="en-US" dirty="0" smtClean="0">
+                <a:solidFill>
+                  <a:srgbClr val="FFC000"/>
+                </a:solidFill>
+              </a:rPr>
+              <a:t>Under what circumstances?</a:t>
+            </a:r>
+            <a:endParaRPr lang="en-US" dirty="0">
+              <a:solidFill>
+                <a:srgbClr val="FFC000"/>
+              </a:solidFill>
+            </a:endParaRPr>
+          </a:p>
+        </p:txBody>
+      </p:sp>
+      <p:sp>
+        <p:nvSpPr>
+          <p:cNvPr id="3" name="Content Placeholder 2"/>
+          <p:cNvSpPr>
+            <a:spLocks noGrp="1"/>
+          </p:cNvSpPr>
+          <p:nvPr>
+            <p:ph idx="1"/>
+          </p:nvPr>
+        </p:nvSpPr>
+        <p:spPr>
+          <a:xfrm>
+            <a:off x="838200" y="1825625"/>
+            <a:ext cx="5459233" cy="4351338"/>
+          </a:xfrm>
+        </p:spPr>
+        <p:txBody>
+          <a:bodyPr>
+            <a:normAutofit/>
+          </a:bodyPr>
+          <a:lstStyle/>
+          <a:p>
+            <a:r>
               <a:rPr lang="en-US" dirty="0" smtClean="0"/>
-              <a:t>Done. Crop </a:t>
-            </a:r>
-            <a:r>
-              <a:rPr lang="en-US" smtClean="0"/>
-              <a:t>rotation reduces weeds by ~50%. </a:t>
+              <a:t>Weed </a:t>
+            </a:r>
+            <a:r>
+              <a:rPr lang="en-US" dirty="0"/>
+              <a:t>density is particularly reduced in zero-tillage systems</a:t>
+            </a:r>
+            <a:r>
+              <a:rPr lang="en-US" dirty="0" smtClean="0"/>
+              <a:t>.</a:t>
+            </a:r>
+          </a:p>
+          <a:p>
+            <a:endParaRPr lang="en-US" dirty="0"/>
+          </a:p>
+        </p:txBody>
+      </p:sp>
+      <p:pic>
+        <p:nvPicPr>
+          <p:cNvPr id="4" name="Content Placeholder 3"/>
+          <p:cNvPicPr>
+            <a:picLocks noChangeAspect="1"/>
+          </p:cNvPicPr>
+          <p:nvPr/>
+        </p:nvPicPr>
+        <p:blipFill>
+          <a:blip r:embed="rId2">
+            <a:extLst>
+              <a:ext uri="{28A0092B-C50C-407E-A947-70E740481C1C}">
+                <a14:useLocalDpi xmlns:a14="http://schemas.microsoft.com/office/drawing/2010/main" val="0"/>
+              </a:ext>
+            </a:extLst>
+          </a:blip>
+          <a:stretch>
+            <a:fillRect/>
+          </a:stretch>
+        </p:blipFill>
+        <p:spPr>
+          <a:xfrm>
+            <a:off x="6225871" y="2053011"/>
+            <a:ext cx="5894567" cy="4123952"/>
+          </a:xfrm>
+          <a:prstGeom prst="rect">
+            <a:avLst/>
+          </a:prstGeom>
+        </p:spPr>
+      </p:pic>
+      <p:sp>
+        <p:nvSpPr>
+          <p:cNvPr id="5" name="Oval 4"/>
+          <p:cNvSpPr/>
+          <p:nvPr/>
+        </p:nvSpPr>
+        <p:spPr>
+          <a:xfrm>
+            <a:off x="6096000" y="2649359"/>
+            <a:ext cx="3474720" cy="968485"/>
+          </a:xfrm>
+          <a:prstGeom prst="ellipse">
+            <a:avLst/>
+          </a:prstGeom>
+          <a:noFill/>
+          <a:ln w="57150">
+            <a:solidFill>
+              <a:srgbClr val="FF0000"/>
+            </a:solidFill>
+          </a:ln>
+        </p:spPr>
+        <p:style>
+          <a:lnRef idx="2">
+            <a:schemeClr val="accent1">
+              <a:shade val="50000"/>
+            </a:schemeClr>
+          </a:lnRef>
+          <a:fillRef idx="1">
+            <a:schemeClr val="accent1"/>
+          </a:fillRef>
+          <a:effectRef idx="0">
+            <a:schemeClr val="accent1"/>
+          </a:effectRef>
+          <a:fontRef idx="minor">
+            <a:schemeClr val="lt1"/>
+          </a:fontRef>
+        </p:style>
+        <p:txBody>
+          <a:bodyPr rtlCol="0" anchor="ctr"/>
+          <a:lstStyle/>
+          <a:p>
+            <a:pPr algn="ctr"/>
+            <a:endParaRPr lang="en-US"/>
+          </a:p>
+        </p:txBody>
+      </p:sp>
+    </p:spTree>
+    <p:extLst>
+      <p:ext uri="{BB962C8B-B14F-4D97-AF65-F5344CB8AC3E}">
+        <p14:creationId xmlns:p14="http://schemas.microsoft.com/office/powerpoint/2010/main" val="2928503791"/>
+      </p:ext>
+    </p:extLst>
+  </p:cSld>
+  <p:clrMapOvr>
+    <a:masterClrMapping/>
+  </p:clrMapOvr>
+</p:sld>
+</file>
+
+<file path=ppt/slides/slide16.xml><?xml version="1.0" encoding="utf-8"?>
+<p:sld xmlns:a="http://schemas.openxmlformats.org/drawingml/2006/main" xmlns:r="http://schemas.openxmlformats.org/officeDocument/2006/relationships" xmlns:p="http://schemas.openxmlformats.org/presentationml/2006/main">
+  <p:cSld>
+    <p:spTree>
+      <p:nvGrpSpPr>
+        <p:cNvPr id="1" name=""/>
+        <p:cNvGrpSpPr/>
+        <p:nvPr/>
+      </p:nvGrpSpPr>
+      <p:grpSpPr>
+        <a:xfrm>
+          <a:off x="0" y="0"/>
+          <a:ext cx="0" cy="0"/>
+          <a:chOff x="0" y="0"/>
+          <a:chExt cx="0" cy="0"/>
+        </a:xfrm>
+      </p:grpSpPr>
+      <p:sp>
+        <p:nvSpPr>
+          <p:cNvPr id="2" name="Title 1"/>
+          <p:cNvSpPr>
+            <a:spLocks noGrp="1"/>
+          </p:cNvSpPr>
+          <p:nvPr>
+            <p:ph type="title"/>
+          </p:nvPr>
+        </p:nvSpPr>
+        <p:spPr/>
+        <p:txBody>
+          <a:bodyPr/>
+          <a:lstStyle/>
+          <a:p>
+            <a:r>
+              <a:rPr lang="en-US" dirty="0" smtClean="0">
+                <a:solidFill>
+                  <a:srgbClr val="FFC000"/>
+                </a:solidFill>
+              </a:rPr>
+              <a:t>Under what circumstances?</a:t>
+            </a:r>
+            <a:endParaRPr lang="en-US" dirty="0">
+              <a:solidFill>
+                <a:srgbClr val="FFC000"/>
+              </a:solidFill>
+            </a:endParaRPr>
+          </a:p>
+        </p:txBody>
+      </p:sp>
+      <p:sp>
+        <p:nvSpPr>
+          <p:cNvPr id="3" name="Content Placeholder 2"/>
+          <p:cNvSpPr>
+            <a:spLocks noGrp="1"/>
+          </p:cNvSpPr>
+          <p:nvPr>
+            <p:ph idx="1"/>
+          </p:nvPr>
+        </p:nvSpPr>
+        <p:spPr>
+          <a:xfrm>
+            <a:off x="838200" y="1825625"/>
+            <a:ext cx="5459233" cy="4351338"/>
+          </a:xfrm>
+        </p:spPr>
+        <p:txBody>
+          <a:bodyPr>
+            <a:normAutofit/>
+          </a:bodyPr>
+          <a:lstStyle/>
+          <a:p>
+            <a:r>
+              <a:rPr lang="en-US" dirty="0" smtClean="0"/>
+              <a:t>Long </a:t>
+            </a:r>
+            <a:r>
+              <a:rPr lang="en-US" dirty="0" smtClean="0"/>
+              <a:t>rotations help in both herbicide- and organic-based systems. </a:t>
+            </a:r>
+            <a:endParaRPr lang="en-US" dirty="0"/>
+          </a:p>
+          <a:p>
+            <a:endParaRPr lang="en-US" dirty="0"/>
+          </a:p>
+        </p:txBody>
+      </p:sp>
+      <p:pic>
+        <p:nvPicPr>
+          <p:cNvPr id="4" name="Content Placeholder 3"/>
+          <p:cNvPicPr>
+            <a:picLocks noChangeAspect="1"/>
+          </p:cNvPicPr>
+          <p:nvPr/>
+        </p:nvPicPr>
+        <p:blipFill>
+          <a:blip r:embed="rId2">
+            <a:extLst>
+              <a:ext uri="{28A0092B-C50C-407E-A947-70E740481C1C}">
+                <a14:useLocalDpi xmlns:a14="http://schemas.microsoft.com/office/drawing/2010/main" val="0"/>
+              </a:ext>
+            </a:extLst>
+          </a:blip>
+          <a:stretch>
+            <a:fillRect/>
+          </a:stretch>
+        </p:blipFill>
+        <p:spPr>
+          <a:xfrm>
+            <a:off x="6225871" y="2053011"/>
+            <a:ext cx="5894567" cy="4123952"/>
+          </a:xfrm>
+          <a:prstGeom prst="rect">
+            <a:avLst/>
+          </a:prstGeom>
+        </p:spPr>
+      </p:pic>
+      <p:sp>
+        <p:nvSpPr>
+          <p:cNvPr id="5" name="Oval 4"/>
+          <p:cNvSpPr/>
+          <p:nvPr/>
+        </p:nvSpPr>
+        <p:spPr>
+          <a:xfrm>
+            <a:off x="6096000" y="4923432"/>
+            <a:ext cx="3474720" cy="968485"/>
+          </a:xfrm>
+          <a:prstGeom prst="ellipse">
+            <a:avLst/>
+          </a:prstGeom>
+          <a:noFill/>
+          <a:ln w="57150">
+            <a:solidFill>
+              <a:srgbClr val="FF0000"/>
+            </a:solidFill>
+          </a:ln>
+        </p:spPr>
+        <p:style>
+          <a:lnRef idx="2">
+            <a:schemeClr val="accent1">
+              <a:shade val="50000"/>
+            </a:schemeClr>
+          </a:lnRef>
+          <a:fillRef idx="1">
+            <a:schemeClr val="accent1"/>
+          </a:fillRef>
+          <a:effectRef idx="0">
+            <a:schemeClr val="accent1"/>
+          </a:effectRef>
+          <a:fontRef idx="minor">
+            <a:schemeClr val="lt1"/>
+          </a:fontRef>
+        </p:style>
+        <p:txBody>
+          <a:bodyPr rtlCol="0" anchor="ctr"/>
+          <a:lstStyle/>
+          <a:p>
+            <a:pPr algn="ctr"/>
+            <a:endParaRPr lang="en-US"/>
+          </a:p>
+        </p:txBody>
+      </p:sp>
+    </p:spTree>
+    <p:extLst>
+      <p:ext uri="{BB962C8B-B14F-4D97-AF65-F5344CB8AC3E}">
+        <p14:creationId xmlns:p14="http://schemas.microsoft.com/office/powerpoint/2010/main" val="4216209157"/>
+      </p:ext>
+    </p:extLst>
+  </p:cSld>
+  <p:clrMapOvr>
+    <a:masterClrMapping/>
+  </p:clrMapOvr>
+</p:sld>
+</file>
+
+<file path=ppt/slides/slide17.xml><?xml version="1.0" encoding="utf-8"?>
+<p:sld xmlns:a="http://schemas.openxmlformats.org/drawingml/2006/main" xmlns:r="http://schemas.openxmlformats.org/officeDocument/2006/relationships" xmlns:p="http://schemas.openxmlformats.org/presentationml/2006/main">
+  <p:cSld>
+    <p:spTree>
+      <p:nvGrpSpPr>
+        <p:cNvPr id="1" name=""/>
+        <p:cNvGrpSpPr/>
+        <p:nvPr/>
+      </p:nvGrpSpPr>
+      <p:grpSpPr>
+        <a:xfrm>
+          <a:off x="0" y="0"/>
+          <a:ext cx="0" cy="0"/>
+          <a:chOff x="0" y="0"/>
+          <a:chExt cx="0" cy="0"/>
+        </a:xfrm>
+      </p:grpSpPr>
+      <p:sp>
+        <p:nvSpPr>
+          <p:cNvPr id="2" name="Title 1"/>
+          <p:cNvSpPr>
+            <a:spLocks noGrp="1"/>
+          </p:cNvSpPr>
+          <p:nvPr>
+            <p:ph type="title"/>
+          </p:nvPr>
+        </p:nvSpPr>
+        <p:spPr/>
+        <p:txBody>
+          <a:bodyPr/>
+          <a:lstStyle/>
+          <a:p>
+            <a:r>
+              <a:rPr lang="en-US" dirty="0" smtClean="0"/>
+              <a:t>Crop </a:t>
+            </a:r>
+            <a:r>
+              <a:rPr lang="en-US" dirty="0" smtClean="0"/>
+              <a:t>rotation reduces </a:t>
+            </a:r>
+            <a:r>
+              <a:rPr lang="en-US" dirty="0" smtClean="0"/>
+              <a:t>weed density </a:t>
+            </a:r>
+            <a:r>
+              <a:rPr lang="en-US" dirty="0" smtClean="0"/>
+              <a:t>by ~50%. </a:t>
             </a:r>
             <a:endParaRPr lang="en-US" dirty="0"/>
           </a:p>
@@ -3714,15 +4132,7 @@
           <a:p>
             <a:r>
               <a:rPr lang="en-US" sz="4800" dirty="0" smtClean="0"/>
-              <a:t>Are </a:t>
-            </a:r>
-            <a:r>
-              <a:rPr lang="en-US" sz="4800" dirty="0" smtClean="0"/>
-              <a:t>longer</a:t>
-            </a:r>
-            <a:r>
-              <a:rPr lang="en-US" sz="4800" dirty="0" smtClean="0"/>
-              <a:t> </a:t>
+              <a:t>Are longer </a:t>
             </a:r>
             <a:r>
               <a:rPr lang="en-US" sz="4800" dirty="0"/>
@@ -3786,7 +4196,6 @@
               <a:rPr lang="en-US" dirty="0"/>
               <a:t>Why should you care?</a:t>
             </a:r>
-            <a:endParaRPr lang="en-US" dirty="0"/>
           </a:p>
         </p:txBody>
       </p:sp>
@@ -3847,6 +4256,12 @@
               <a:rPr lang="en-US" dirty="0"/>
               <a:t>are becoming resistant to our herbicides because we use them too heavily. </a:t>
             </a:r>
+            <a:endParaRPr lang="en-US" dirty="0" smtClean="0"/>
+          </a:p>
+          <a:p>
+            <a:pPr marL="0" indent="0">
+              <a:buNone/>
+            </a:pPr>
             <a:endParaRPr lang="en-US" dirty="0" smtClean="0"/>
           </a:p>
           <a:p>
@@ -3921,6 +4336,35 @@
       </p:sp>
       <p:pic>
         <p:nvPicPr>
+          <p:cNvPr id="6" name="Content Placeholder 5"/>
+          <p:cNvPicPr>
+            <a:picLocks noGrp="1" noChangeAspect="1"/>
+          </p:cNvPicPr>
+          <p:nvPr>
+            <p:ph idx="1"/>
+          </p:nvPr>
+        </p:nvPicPr>
+        <p:blipFill>
+          <a:blip r:embed="rId2">
+            <a:extLst>
+              <a:ext uri="{28A0092B-C50C-407E-A947-70E740481C1C}">
+                <a14:useLocalDpi xmlns:a14="http://schemas.microsoft.com/office/drawing/2010/main" val="0"/>
+              </a:ext>
+            </a:extLst>
+          </a:blip>
+          <a:stretch>
+            <a:fillRect/>
+          </a:stretch>
+        </p:blipFill>
+        <p:spPr>
+          <a:xfrm>
+            <a:off x="5536427" y="3072304"/>
+            <a:ext cx="5715000" cy="3009900"/>
+          </a:xfrm>
+        </p:spPr>
+      </p:pic>
+      <p:pic>
+        <p:nvPicPr>
           <p:cNvPr id="7" name="Picture 6"/>
           <p:cNvPicPr>
             <a:picLocks noChangeAspect="1"/>
@@ -3928,7 +4372,7 @@
           <p:nvPr/>
         </p:nvPicPr>
         <p:blipFill>
-          <a:blip r:embed="rId2">
+          <a:blip r:embed="rId3">
             <a:extLst>
               <a:ext uri="{28A0092B-C50C-407E-A947-70E740481C1C}">
                 <a14:useLocalDpi xmlns:a14="http://schemas.microsoft.com/office/drawing/2010/main" val="0"/>
@@ -3949,35 +4393,6 @@
           </a:prstGeom>
         </p:spPr>
       </p:pic>
-      <p:pic>
-        <p:nvPicPr>
-          <p:cNvPr id="6" name="Content Placeholder 5"/>
-          <p:cNvPicPr>
-            <a:picLocks noGrp="1" noChangeAspect="1"/>
-          </p:cNvPicPr>
-          <p:nvPr>
-            <p:ph idx="1"/>
-          </p:nvPr>
-        </p:nvPicPr>
-        <p:blipFill>
-          <a:blip r:embed="rId3">
-            <a:extLst>
-              <a:ext uri="{28A0092B-C50C-407E-A947-70E740481C1C}">
-                <a14:useLocalDpi xmlns:a14="http://schemas.microsoft.com/office/drawing/2010/main" val="0"/>
-              </a:ext>
-            </a:extLst>
-          </a:blip>
-          <a:stretch>
-            <a:fillRect/>
-          </a:stretch>
-        </p:blipFill>
-        <p:spPr>
-          <a:xfrm>
-            <a:off x="5747800" y="2779801"/>
-            <a:ext cx="5757075" cy="3032060"/>
-          </a:xfrm>
-        </p:spPr>
-      </p:pic>
       <p:sp>
         <p:nvSpPr>
           <p:cNvPr id="8" name="Rectangle 7"/>
@@ -4000,10 +4415,18 @@
           <a:lstStyle/>
           <a:p>
             <a:r>
-              <a:rPr lang="en-US" sz="1000" smtClean="0"/>
+              <a:rPr lang="en-US" sz="1000" dirty="0" smtClean="0">
+                <a:solidFill>
+                  <a:schemeClr val="bg1"/>
+                </a:solidFill>
+              </a:rPr>
               <a:t>https://www.wakingtimes.com/2016/11/18/banned-eu-dangerous-chemical-americans/atrazine-frog-usa/</a:t>
             </a:r>
-            <a:endParaRPr lang="en-US" sz="1000" dirty="0"/>
+            <a:endParaRPr lang="en-US" sz="1000" dirty="0">
+              <a:solidFill>
+                <a:schemeClr val="bg1"/>
+              </a:solidFill>
+            </a:endParaRPr>
           </a:p>
         </p:txBody>
       </p:sp>
@@ -5008,13 +5431,25 @@
             </a:pPr>
             <a:r>
               <a:rPr lang="en-US" dirty="0"/>
-              <a:t> (1) LRR ~ B0 + </a:t>
+              <a:t> (1) </a:t>
+            </a:r>
+            <a:r>
+              <a:rPr lang="en-US" dirty="0" smtClean="0"/>
+              <a:t>LRR </a:t>
+            </a:r>
+            <a:r>
+              <a:rPr lang="en-US" dirty="0"/>
+              <a:t>~ B0 + </a:t>
             </a:r>
             <a:r>
               <a:rPr lang="en-US" i="1" dirty="0" smtClean="0"/>
-              <a:t>study</a:t>
-            </a:r>
-            <a:endParaRPr lang="en-US" i="1" dirty="0"/>
+              <a:t>a1*study </a:t>
+            </a:r>
+            <a:r>
+              <a:rPr lang="en-US" dirty="0" smtClean="0"/>
+              <a:t>+ e</a:t>
+            </a:r>
+            <a:endParaRPr lang="en-US" dirty="0"/>
           </a:p>
           <a:p>
             <a:pPr marL="0" indent="0">
@@ -5026,7 +5461,7 @@
             </a:r>
             <a:r>
               <a:rPr lang="en-US" dirty="0" smtClean="0"/>
-              <a:t>mod1*x </a:t>
+              <a:t>B1*mod1 </a:t>
             </a:r>
             <a:r>
               <a:rPr lang="en-US" dirty="0"/>
@@ -5034,9 +5469,13 @@
             </a:r>
             <a:r>
               <a:rPr lang="en-US" i="1" dirty="0" smtClean="0"/>
-              <a:t>study</a:t>
-            </a:r>
-            <a:endParaRPr lang="en-US" i="1" dirty="0"/>
+              <a:t>a1*study </a:t>
+            </a:r>
+            <a:r>
+              <a:rPr lang="en-US" dirty="0" smtClean="0"/>
+              <a:t>+ e</a:t>
+            </a:r>
+            <a:endParaRPr lang="en-US" dirty="0"/>
           </a:p>
         </p:txBody>
       </p:sp>
@@ -5135,15 +5574,7 @@
             </a:pPr>
             <a:r>
               <a:rPr lang="en-US" dirty="0" smtClean="0"/>
-              <a:t>Single modifier </a:t>
-            </a:r>
-            <a:r>
-              <a:rPr lang="en-US" dirty="0" smtClean="0"/>
-              <a:t>levels different (p&lt;0.01) from 0?</a:t>
-            </a:r>
-            <a:r>
-              <a:rPr lang="en-US" dirty="0" smtClean="0"/>
-              <a:t> </a:t>
+              <a:t>Single modifier levels different (p&lt;0.01) from 0? </a:t>
             </a:r>
           </a:p>
           <a:p>
@@ -5357,7 +5788,7 @@
 <file path=ppt/theme/theme1.xml><?xml version="1.0" encoding="utf-8"?>
 <a:theme xmlns:a="http://schemas.openxmlformats.org/drawingml/2006/main" name="Office Theme">
   <a:themeElements>
-    <a:clrScheme name="Office">
+    <a:clrScheme name="Office Theme">
       <a:dk1>
         <a:sysClr val="windowText" lastClr="000000"/>
       </a:dk1>
@@ -5371,22 +5802,22 @@
         <a:srgbClr val="E7E6E6"/>
       </a:lt2>
       <a:accent1>
-        <a:srgbClr val="5B9BD5"/>
+        <a:srgbClr val="29AF8C"/>
       </a:accent1>
       <a:accent2>
-        <a:srgbClr val="ED7D31"/>
+        <a:srgbClr val="97BE49"/>
       </a:accent2>
       <a:accent3>
-        <a:srgbClr val="A5A5A5"/>
+        <a:srgbClr val="3D9CCC"/>
       </a:accent3>
       <a:accent4>
-        <a:srgbClr val="FFC000"/>
+        <a:srgbClr val="7C60C6"/>
       </a:accent4>
       <a:accent5>
-        <a:srgbClr val="4472C4"/>
+        <a:srgbClr val="C9492C"/>
       </a:accent5>
       <a:accent6>
-        <a:srgbClr val="70AD47"/>
+        <a:srgbClr val="D58C2E"/>
       </a:accent6>
       <a:hlink>
         <a:srgbClr val="0563C1"/>
@@ -5395,14 +5826,14 @@
         <a:srgbClr val="954F72"/>
       </a:folHlink>
     </a:clrScheme>
-    <a:fontScheme name="Office">
+    <a:fontScheme name="Office Theme">
       <a:majorFont>
         <a:latin typeface="Calibri Light" panose="020F0302020204030204"/>
         <a:ea typeface=""/>
         <a:cs typeface=""/>
-        <a:font script="Jpan" typeface="Yu Gothic Light"/>
+        <a:font script="Jpan" typeface="游ゴシック Light"/>
         <a:font script="Hang" typeface="맑은 고딕"/>
-        <a:font script="Hans" typeface="DengXian Light"/>
+        <a:font script="Hans" typeface="等线 Light"/>
         <a:font script="Hant" typeface="新細明體"/>
         <a:font script="Arab" typeface="Times New Roman"/>
         <a:font script="Hebr" typeface="Times New Roman"/>
@@ -5435,9 +5866,9 @@
         <a:latin typeface="Calibri" panose="020F0502020204030204"/>
         <a:ea typeface=""/>
         <a:cs typeface=""/>
-        <a:font script="Jpan" typeface="Yu Gothic"/>
+        <a:font script="Jpan" typeface="游ゴシック"/>
         <a:font script="Hang" typeface="맑은 고딕"/>
-        <a:font script="Hans" typeface="DengXian"/>
+        <a:font script="Hans" typeface="等线"/>
         <a:font script="Hant" typeface="新細明體"/>
         <a:font script="Arab" typeface="Arial"/>
         <a:font script="Hebr" typeface="Arial"/>
@@ -5467,7 +5898,7 @@
         <a:font script="Geor" typeface="Sylfaen"/>
       </a:minorFont>
     </a:fontScheme>
-    <a:fmtScheme name="Office">
+    <a:fmtScheme name="Office Theme">
       <a:fillStyleLst>
         <a:solidFill>
           <a:schemeClr val="phClr"/>
@@ -5609,7 +6040,7 @@
   <a:extraClrSchemeLst/>
   <a:extLst>
     <a:ext uri="{05A4C25C-085E-4340-85A3-A5531E510DB2}">
-      <thm15:themeFamily xmlns:thm15="http://schemas.microsoft.com/office/thememl/2012/main" name="Office Theme" id="{62F939B6-93AF-4DB8-9C6B-D6C7DFDC589F}" vid="{4A3C46E8-61CC-4603-A589-7422A47A8E4A}"/>
+      <thm15:themeFamily xmlns:thm15="http://schemas.microsoft.com/office/thememl/2012/main" name="Office Theme" id="{62F939B6-93AF-4DB8-9C6B-D6C7DFDC589F}" vid="{3E4F19A7-A959-40BB-972C-4880BAF8EB09}"/>
     </a:ext>
   </a:extLst>
 </a:theme>

</xml_diff>